<commit_message>
Updates to AWS code
</commit_message>
<xml_diff>
--- a/Aim1/figures/FigureS1.pptx
+++ b/Aim1/figures/FigureS1.pptx
@@ -6,6 +6,7 @@
   </p:sldMasterIdLst>
   <p:sldIdLst>
     <p:sldId id="256" r:id="rId2"/>
+    <p:sldId id="257" r:id="rId3"/>
   </p:sldIdLst>
   <p:sldSz cx="6858000" cy="6858000"/>
   <p:notesSz cx="6858000" cy="9144000"/>
@@ -104,7 +105,73 @@
       </a:defRPr>
     </a:lvl9pPr>
   </p:defaultTextStyle>
+  <p:extLst>
+    <p:ext uri="{EFAFB233-063F-42B5-8137-9DF3F51BA10A}">
+      <p15:sldGuideLst xmlns:p15="http://schemas.microsoft.com/office/powerpoint/2012/main"/>
+    </p:ext>
+  </p:extLst>
 </p:presentation>
+</file>
+
+<file path=ppt/revisionInfo.xml><?xml version="1.0" encoding="utf-8"?>
+<p1510:revInfo xmlns:a="http://schemas.openxmlformats.org/drawingml/2006/main" xmlns:r="http://schemas.openxmlformats.org/officeDocument/2006/relationships" xmlns:p1510="http://schemas.microsoft.com/office/powerpoint/2015/10/main">
+  <p1510:revLst>
+    <p1510:client id="{5A6E2A30-B753-2F4D-9590-D4F9C08F9399}" v="2" dt="2024-01-31T01:53:15.595"/>
+  </p1510:revLst>
+</p1510:revInfo>
+</file>
+
+<file path=ppt/changesInfos/changesInfo1.xml><?xml version="1.0" encoding="utf-8"?>
+<pc:chgInfo xmlns:a="http://schemas.openxmlformats.org/drawingml/2006/main" xmlns:r="http://schemas.openxmlformats.org/officeDocument/2006/relationships" xmlns:ac="http://schemas.microsoft.com/office/drawing/2013/main/command" xmlns:pc="http://schemas.microsoft.com/office/powerpoint/2013/main/command">
+  <pc:docChgLst>
+    <pc:chgData name="Maxwell Cook" userId="6270a8f4b8f62cae" providerId="LiveId" clId="{5A6E2A30-B753-2F4D-9590-D4F9C08F9399}"/>
+    <pc:docChg chg="custSel addSld modSld">
+      <pc:chgData name="Maxwell Cook" userId="6270a8f4b8f62cae" providerId="LiveId" clId="{5A6E2A30-B753-2F4D-9590-D4F9C08F9399}" dt="2024-01-31T01:53:21.468" v="15" actId="1076"/>
+      <pc:docMkLst>
+        <pc:docMk/>
+      </pc:docMkLst>
+      <pc:sldChg chg="addSp delSp modSp new mod">
+        <pc:chgData name="Maxwell Cook" userId="6270a8f4b8f62cae" providerId="LiveId" clId="{5A6E2A30-B753-2F4D-9590-D4F9C08F9399}" dt="2024-01-31T01:53:21.468" v="15" actId="1076"/>
+        <pc:sldMkLst>
+          <pc:docMk/>
+          <pc:sldMk cId="2888378435" sldId="257"/>
+        </pc:sldMkLst>
+        <pc:spChg chg="del">
+          <ac:chgData name="Maxwell Cook" userId="6270a8f4b8f62cae" providerId="LiveId" clId="{5A6E2A30-B753-2F4D-9590-D4F9C08F9399}" dt="2024-01-31T01:44:18.577" v="1" actId="478"/>
+          <ac:spMkLst>
+            <pc:docMk/>
+            <pc:sldMk cId="2888378435" sldId="257"/>
+            <ac:spMk id="2" creationId="{9FAEF652-6766-FB5F-1952-6F6056B77580}"/>
+          </ac:spMkLst>
+        </pc:spChg>
+        <pc:spChg chg="del">
+          <ac:chgData name="Maxwell Cook" userId="6270a8f4b8f62cae" providerId="LiveId" clId="{5A6E2A30-B753-2F4D-9590-D4F9C08F9399}" dt="2024-01-31T01:44:20.152" v="2" actId="478"/>
+          <ac:spMkLst>
+            <pc:docMk/>
+            <pc:sldMk cId="2888378435" sldId="257"/>
+            <ac:spMk id="3" creationId="{1D93BBC8-96D4-1AAF-F272-323656077C90}"/>
+          </ac:spMkLst>
+        </pc:spChg>
+        <pc:graphicFrameChg chg="add mod modGraphic">
+          <ac:chgData name="Maxwell Cook" userId="6270a8f4b8f62cae" providerId="LiveId" clId="{5A6E2A30-B753-2F4D-9590-D4F9C08F9399}" dt="2024-01-31T01:53:21.468" v="15" actId="1076"/>
+          <ac:graphicFrameMkLst>
+            <pc:docMk/>
+            <pc:sldMk cId="2888378435" sldId="257"/>
+            <ac:graphicFrameMk id="6" creationId="{64F8CBCD-ADCD-77EC-920C-F630C82B5345}"/>
+          </ac:graphicFrameMkLst>
+        </pc:graphicFrameChg>
+        <pc:picChg chg="add mod">
+          <ac:chgData name="Maxwell Cook" userId="6270a8f4b8f62cae" providerId="LiveId" clId="{5A6E2A30-B753-2F4D-9590-D4F9C08F9399}" dt="2024-01-31T01:45:37.283" v="12" actId="1076"/>
+          <ac:picMkLst>
+            <pc:docMk/>
+            <pc:sldMk cId="2888378435" sldId="257"/>
+            <ac:picMk id="5" creationId="{85B71408-9E8A-771A-7485-89082BEE5ACA}"/>
+          </ac:picMkLst>
+        </pc:picChg>
+      </pc:sldChg>
+    </pc:docChg>
+  </pc:docChgLst>
+</pc:chgInfo>
 </file>
 
 <file path=ppt/slideLayouts/slideLayout1.xml><?xml version="1.0" encoding="utf-8"?>
@@ -238,7 +305,7 @@
           <a:p>
             <a:fld id="{172BB8A3-3FB0-6F42-9F4A-242D73F035D9}" type="datetimeFigureOut">
               <a:rPr lang="en-US" smtClean="0"/>
-              <a:t>10/31/23</a:t>
+              <a:t>1/30/24</a:t>
             </a:fld>
             <a:endParaRPr lang="en-US"/>
           </a:p>
@@ -408,7 +475,7 @@
           <a:p>
             <a:fld id="{172BB8A3-3FB0-6F42-9F4A-242D73F035D9}" type="datetimeFigureOut">
               <a:rPr lang="en-US" smtClean="0"/>
-              <a:t>10/31/23</a:t>
+              <a:t>1/30/24</a:t>
             </a:fld>
             <a:endParaRPr lang="en-US"/>
           </a:p>
@@ -588,7 +655,7 @@
           <a:p>
             <a:fld id="{172BB8A3-3FB0-6F42-9F4A-242D73F035D9}" type="datetimeFigureOut">
               <a:rPr lang="en-US" smtClean="0"/>
-              <a:t>10/31/23</a:t>
+              <a:t>1/30/24</a:t>
             </a:fld>
             <a:endParaRPr lang="en-US"/>
           </a:p>
@@ -758,7 +825,7 @@
           <a:p>
             <a:fld id="{172BB8A3-3FB0-6F42-9F4A-242D73F035D9}" type="datetimeFigureOut">
               <a:rPr lang="en-US" smtClean="0"/>
-              <a:t>10/31/23</a:t>
+              <a:t>1/30/24</a:t>
             </a:fld>
             <a:endParaRPr lang="en-US"/>
           </a:p>
@@ -1002,7 +1069,7 @@
           <a:p>
             <a:fld id="{172BB8A3-3FB0-6F42-9F4A-242D73F035D9}" type="datetimeFigureOut">
               <a:rPr lang="en-US" smtClean="0"/>
-              <a:t>10/31/23</a:t>
+              <a:t>1/30/24</a:t>
             </a:fld>
             <a:endParaRPr lang="en-US"/>
           </a:p>
@@ -1234,7 +1301,7 @@
           <a:p>
             <a:fld id="{172BB8A3-3FB0-6F42-9F4A-242D73F035D9}" type="datetimeFigureOut">
               <a:rPr lang="en-US" smtClean="0"/>
-              <a:t>10/31/23</a:t>
+              <a:t>1/30/24</a:t>
             </a:fld>
             <a:endParaRPr lang="en-US"/>
           </a:p>
@@ -1601,7 +1668,7 @@
           <a:p>
             <a:fld id="{172BB8A3-3FB0-6F42-9F4A-242D73F035D9}" type="datetimeFigureOut">
               <a:rPr lang="en-US" smtClean="0"/>
-              <a:t>10/31/23</a:t>
+              <a:t>1/30/24</a:t>
             </a:fld>
             <a:endParaRPr lang="en-US"/>
           </a:p>
@@ -1719,7 +1786,7 @@
           <a:p>
             <a:fld id="{172BB8A3-3FB0-6F42-9F4A-242D73F035D9}" type="datetimeFigureOut">
               <a:rPr lang="en-US" smtClean="0"/>
-              <a:t>10/31/23</a:t>
+              <a:t>1/30/24</a:t>
             </a:fld>
             <a:endParaRPr lang="en-US"/>
           </a:p>
@@ -1814,7 +1881,7 @@
           <a:p>
             <a:fld id="{172BB8A3-3FB0-6F42-9F4A-242D73F035D9}" type="datetimeFigureOut">
               <a:rPr lang="en-US" smtClean="0"/>
-              <a:t>10/31/23</a:t>
+              <a:t>1/30/24</a:t>
             </a:fld>
             <a:endParaRPr lang="en-US"/>
           </a:p>
@@ -2091,7 +2158,7 @@
           <a:p>
             <a:fld id="{172BB8A3-3FB0-6F42-9F4A-242D73F035D9}" type="datetimeFigureOut">
               <a:rPr lang="en-US" smtClean="0"/>
-              <a:t>10/31/23</a:t>
+              <a:t>1/30/24</a:t>
             </a:fld>
             <a:endParaRPr lang="en-US"/>
           </a:p>
@@ -2348,7 +2415,7 @@
           <a:p>
             <a:fld id="{172BB8A3-3FB0-6F42-9F4A-242D73F035D9}" type="datetimeFigureOut">
               <a:rPr lang="en-US" smtClean="0"/>
-              <a:t>10/31/23</a:t>
+              <a:t>1/30/24</a:t>
             </a:fld>
             <a:endParaRPr lang="en-US"/>
           </a:p>
@@ -2561,7 +2628,7 @@
           <a:p>
             <a:fld id="{172BB8A3-3FB0-6F42-9F4A-242D73F035D9}" type="datetimeFigureOut">
               <a:rPr lang="en-US" smtClean="0"/>
-              <a:t>10/31/23</a:t>
+              <a:t>1/30/24</a:t>
             </a:fld>
             <a:endParaRPr lang="en-US"/>
           </a:p>
@@ -3060,6 +3127,1204 @@
 </p:sld>
 </file>
 
+<file path=ppt/slides/slide2.xml><?xml version="1.0" encoding="utf-8"?>
+<p:sld xmlns:a="http://schemas.openxmlformats.org/drawingml/2006/main" xmlns:r="http://schemas.openxmlformats.org/officeDocument/2006/relationships" xmlns:p="http://schemas.openxmlformats.org/presentationml/2006/main">
+  <p:cSld>
+    <p:spTree>
+      <p:nvGrpSpPr>
+        <p:cNvPr id="1" name=""/>
+        <p:cNvGrpSpPr/>
+        <p:nvPr/>
+      </p:nvGrpSpPr>
+      <p:grpSpPr>
+        <a:xfrm>
+          <a:off x="0" y="0"/>
+          <a:ext cx="0" cy="0"/>
+          <a:chOff x="0" y="0"/>
+          <a:chExt cx="0" cy="0"/>
+        </a:xfrm>
+      </p:grpSpPr>
+      <p:pic>
+        <p:nvPicPr>
+          <p:cNvPr id="5" name="Picture 4" descr="A graph with blue and black squares&#10;&#10;Description automatically generated with medium confidence">
+            <a:extLst>
+              <a:ext uri="{FF2B5EF4-FFF2-40B4-BE49-F238E27FC236}">
+                <a16:creationId xmlns:a16="http://schemas.microsoft.com/office/drawing/2014/main" id="{85B71408-9E8A-771A-7485-89082BEE5ACA}"/>
+              </a:ext>
+            </a:extLst>
+          </p:cNvPr>
+          <p:cNvPicPr>
+            <a:picLocks noChangeAspect="1"/>
+          </p:cNvPicPr>
+          <p:nvPr/>
+        </p:nvPicPr>
+        <p:blipFill>
+          <a:blip r:embed="rId2"/>
+          <a:stretch>
+            <a:fillRect/>
+          </a:stretch>
+        </p:blipFill>
+        <p:spPr>
+          <a:xfrm>
+            <a:off x="0" y="0"/>
+            <a:ext cx="3581401" cy="3581401"/>
+          </a:xfrm>
+          <a:prstGeom prst="rect">
+            <a:avLst/>
+          </a:prstGeom>
+        </p:spPr>
+      </p:pic>
+      <p:graphicFrame>
+        <p:nvGraphicFramePr>
+          <p:cNvPr id="6" name="Table 5">
+            <a:extLst>
+              <a:ext uri="{FF2B5EF4-FFF2-40B4-BE49-F238E27FC236}">
+                <a16:creationId xmlns:a16="http://schemas.microsoft.com/office/drawing/2014/main" id="{64F8CBCD-ADCD-77EC-920C-F630C82B5345}"/>
+              </a:ext>
+            </a:extLst>
+          </p:cNvPr>
+          <p:cNvGraphicFramePr>
+            <a:graphicFrameLocks noGrp="1"/>
+          </p:cNvGraphicFramePr>
+          <p:nvPr>
+            <p:extLst>
+              <p:ext uri="{D42A27DB-BD31-4B8C-83A1-F6EECF244321}">
+                <p14:modId xmlns:p14="http://schemas.microsoft.com/office/powerpoint/2010/main" val="1651012382"/>
+              </p:ext>
+            </p:extLst>
+          </p:nvPr>
+        </p:nvGraphicFramePr>
+        <p:xfrm>
+          <a:off x="3476979" y="358141"/>
+          <a:ext cx="3121378" cy="3223260"/>
+        </p:xfrm>
+        <a:graphic>
+          <a:graphicData uri="http://schemas.openxmlformats.org/drawingml/2006/table">
+            <a:tbl>
+              <a:tblPr>
+                <a:tableStyleId>{5C22544A-7EE6-4342-B048-85BDC9FD1C3A}</a:tableStyleId>
+              </a:tblPr>
+              <a:tblGrid>
+                <a:gridCol w="1156066">
+                  <a:extLst>
+                    <a:ext uri="{9D8B030D-6E8A-4147-A177-3AD203B41FA5}">
+                      <a16:colId xmlns:a16="http://schemas.microsoft.com/office/drawing/2014/main" val="2004541342"/>
+                    </a:ext>
+                  </a:extLst>
+                </a:gridCol>
+                <a:gridCol w="719330">
+                  <a:extLst>
+                    <a:ext uri="{9D8B030D-6E8A-4147-A177-3AD203B41FA5}">
+                      <a16:colId xmlns:a16="http://schemas.microsoft.com/office/drawing/2014/main" val="341115845"/>
+                    </a:ext>
+                  </a:extLst>
+                </a:gridCol>
+                <a:gridCol w="687217">
+                  <a:extLst>
+                    <a:ext uri="{9D8B030D-6E8A-4147-A177-3AD203B41FA5}">
+                      <a16:colId xmlns:a16="http://schemas.microsoft.com/office/drawing/2014/main" val="1633905556"/>
+                    </a:ext>
+                  </a:extLst>
+                </a:gridCol>
+                <a:gridCol w="558765">
+                  <a:extLst>
+                    <a:ext uri="{9D8B030D-6E8A-4147-A177-3AD203B41FA5}">
+                      <a16:colId xmlns:a16="http://schemas.microsoft.com/office/drawing/2014/main" val="463047109"/>
+                    </a:ext>
+                  </a:extLst>
+                </a:gridCol>
+              </a:tblGrid>
+              <a:tr h="442182">
+                <a:tc>
+                  <a:txBody>
+                    <a:bodyPr/>
+                    <a:lstStyle/>
+                    <a:p>
+                      <a:pPr algn="ctr" fontAlgn="ctr"/>
+                      <a:r>
+                        <a:rPr lang="en-US" sz="1200" u="none" strike="noStrike">
+                          <a:effectLst/>
+                        </a:rPr>
+                        <a:t>Classification Scenario</a:t>
+                      </a:r>
+                      <a:endParaRPr lang="en-US" sz="1200" b="1" i="0" u="none" strike="noStrike">
+                        <a:solidFill>
+                          <a:srgbClr val="000000"/>
+                        </a:solidFill>
+                        <a:effectLst/>
+                        <a:latin typeface="Calibri" panose="020F0502020204030204" pitchFamily="34" charset="0"/>
+                      </a:endParaRPr>
+                    </a:p>
+                  </a:txBody>
+                  <a:tcPr marL="9525" marR="9525" marT="9525" marB="0" anchor="ctr"/>
+                </a:tc>
+                <a:tc>
+                  <a:txBody>
+                    <a:bodyPr/>
+                    <a:lstStyle/>
+                    <a:p>
+                      <a:pPr algn="ctr" fontAlgn="ctr"/>
+                      <a:r>
+                        <a:rPr lang="en-US" sz="1200" u="none" strike="noStrike">
+                          <a:effectLst/>
+                        </a:rPr>
+                        <a:t>Description</a:t>
+                      </a:r>
+                      <a:endParaRPr lang="en-US" sz="1200" b="1" i="0" u="none" strike="noStrike">
+                        <a:solidFill>
+                          <a:srgbClr val="000000"/>
+                        </a:solidFill>
+                        <a:effectLst/>
+                        <a:latin typeface="Calibri" panose="020F0502020204030204" pitchFamily="34" charset="0"/>
+                      </a:endParaRPr>
+                    </a:p>
+                  </a:txBody>
+                  <a:tcPr marL="9525" marR="9525" marT="9525" marB="0" anchor="ctr"/>
+                </a:tc>
+                <a:tc>
+                  <a:txBody>
+                    <a:bodyPr/>
+                    <a:lstStyle/>
+                    <a:p>
+                      <a:pPr algn="ctr" fontAlgn="ctr"/>
+                      <a:r>
+                        <a:rPr lang="en-US" sz="1200" u="none" strike="noStrike">
+                          <a:effectLst/>
+                        </a:rPr>
+                        <a:t>Number of Features</a:t>
+                      </a:r>
+                      <a:endParaRPr lang="en-US" sz="1200" b="1" i="0" u="none" strike="noStrike">
+                        <a:solidFill>
+                          <a:srgbClr val="000000"/>
+                        </a:solidFill>
+                        <a:effectLst/>
+                        <a:latin typeface="Calibri" panose="020F0502020204030204" pitchFamily="34" charset="0"/>
+                      </a:endParaRPr>
+                    </a:p>
+                  </a:txBody>
+                  <a:tcPr marL="9525" marR="9525" marT="9525" marB="0" anchor="ctr"/>
+                </a:tc>
+                <a:tc>
+                  <a:txBody>
+                    <a:bodyPr/>
+                    <a:lstStyle/>
+                    <a:p>
+                      <a:pPr algn="ctr" fontAlgn="ctr"/>
+                      <a:r>
+                        <a:rPr lang="en-US" sz="1200" u="none" strike="noStrike">
+                          <a:effectLst/>
+                        </a:rPr>
+                        <a:t>F1-Score</a:t>
+                      </a:r>
+                      <a:endParaRPr lang="en-US" sz="1200" b="1" i="0" u="none" strike="noStrike">
+                        <a:solidFill>
+                          <a:srgbClr val="000000"/>
+                        </a:solidFill>
+                        <a:effectLst/>
+                        <a:latin typeface="Calibri" panose="020F0502020204030204" pitchFamily="34" charset="0"/>
+                      </a:endParaRPr>
+                    </a:p>
+                  </a:txBody>
+                  <a:tcPr marL="9525" marR="9525" marT="9525" marB="0" anchor="ctr"/>
+                </a:tc>
+                <a:extLst>
+                  <a:ext uri="{0D108BD9-81ED-4DB2-BD59-A6C34878D82A}">
+                    <a16:rowId xmlns:a16="http://schemas.microsoft.com/office/drawing/2014/main" val="3853757388"/>
+                  </a:ext>
+                </a:extLst>
+              </a:tr>
+              <a:tr h="172559">
+                <a:tc>
+                  <a:txBody>
+                    <a:bodyPr/>
+                    <a:lstStyle/>
+                    <a:p>
+                      <a:pPr algn="l" fontAlgn="b"/>
+                      <a:r>
+                        <a:rPr lang="en-US" sz="1200" u="none" strike="noStrike">
+                          <a:effectLst/>
+                        </a:rPr>
+                        <a:t>Combined_S1_S2    </a:t>
+                      </a:r>
+                      <a:endParaRPr lang="en-US" sz="1200" b="0" i="0" u="none" strike="noStrike">
+                        <a:solidFill>
+                          <a:srgbClr val="000000"/>
+                        </a:solidFill>
+                        <a:effectLst/>
+                        <a:latin typeface="Calibri" panose="020F0502020204030204" pitchFamily="34" charset="0"/>
+                      </a:endParaRPr>
+                    </a:p>
+                  </a:txBody>
+                  <a:tcPr marL="9525" marR="9525" marT="9525" marB="0" anchor="b"/>
+                </a:tc>
+                <a:tc>
+                  <a:txBody>
+                    <a:bodyPr/>
+                    <a:lstStyle/>
+                    <a:p>
+                      <a:pPr algn="l" fontAlgn="b"/>
+                      <a:endParaRPr lang="en-US" sz="1200" b="0" i="0" u="none" strike="noStrike">
+                        <a:solidFill>
+                          <a:srgbClr val="000000"/>
+                        </a:solidFill>
+                        <a:effectLst/>
+                        <a:latin typeface="Calibri" panose="020F0502020204030204" pitchFamily="34" charset="0"/>
+                      </a:endParaRPr>
+                    </a:p>
+                  </a:txBody>
+                  <a:tcPr marL="9525" marR="9525" marT="9525" marB="0" anchor="b"/>
+                </a:tc>
+                <a:tc>
+                  <a:txBody>
+                    <a:bodyPr/>
+                    <a:lstStyle/>
+                    <a:p>
+                      <a:pPr algn="r" fontAlgn="b"/>
+                      <a:r>
+                        <a:rPr lang="en-US" sz="1200" u="none" strike="noStrike">
+                          <a:effectLst/>
+                        </a:rPr>
+                        <a:t>55</a:t>
+                      </a:r>
+                      <a:endParaRPr lang="en-US" sz="1200" b="0" i="0" u="none" strike="noStrike">
+                        <a:solidFill>
+                          <a:srgbClr val="000000"/>
+                        </a:solidFill>
+                        <a:effectLst/>
+                        <a:latin typeface="Calibri" panose="020F0502020204030204" pitchFamily="34" charset="0"/>
+                      </a:endParaRPr>
+                    </a:p>
+                  </a:txBody>
+                  <a:tcPr marL="9525" marR="9525" marT="9525" marB="0" anchor="b"/>
+                </a:tc>
+                <a:tc>
+                  <a:txBody>
+                    <a:bodyPr/>
+                    <a:lstStyle/>
+                    <a:p>
+                      <a:pPr algn="r" fontAlgn="b"/>
+                      <a:r>
+                        <a:rPr lang="en-US" sz="1200" u="none" strike="noStrike">
+                          <a:effectLst/>
+                        </a:rPr>
+                        <a:t>0.9143</a:t>
+                      </a:r>
+                      <a:endParaRPr lang="en-US" sz="1200" b="0" i="0" u="none" strike="noStrike">
+                        <a:solidFill>
+                          <a:srgbClr val="000000"/>
+                        </a:solidFill>
+                        <a:effectLst/>
+                        <a:latin typeface="Calibri" panose="020F0502020204030204" pitchFamily="34" charset="0"/>
+                      </a:endParaRPr>
+                    </a:p>
+                  </a:txBody>
+                  <a:tcPr marL="9525" marR="9525" marT="9525" marB="0" anchor="b"/>
+                </a:tc>
+                <a:extLst>
+                  <a:ext uri="{0D108BD9-81ED-4DB2-BD59-A6C34878D82A}">
+                    <a16:rowId xmlns:a16="http://schemas.microsoft.com/office/drawing/2014/main" val="2856201742"/>
+                  </a:ext>
+                </a:extLst>
+              </a:tr>
+              <a:tr h="172559">
+                <a:tc>
+                  <a:txBody>
+                    <a:bodyPr/>
+                    <a:lstStyle/>
+                    <a:p>
+                      <a:pPr algn="l" fontAlgn="b"/>
+                      <a:r>
+                        <a:rPr lang="en-US" sz="1200" u="none" strike="noStrike">
+                          <a:effectLst/>
+                        </a:rPr>
+                        <a:t>Summer_Autumn_S2   </a:t>
+                      </a:r>
+                      <a:endParaRPr lang="en-US" sz="1200" b="0" i="0" u="none" strike="noStrike">
+                        <a:solidFill>
+                          <a:srgbClr val="000000"/>
+                        </a:solidFill>
+                        <a:effectLst/>
+                        <a:latin typeface="Calibri" panose="020F0502020204030204" pitchFamily="34" charset="0"/>
+                      </a:endParaRPr>
+                    </a:p>
+                  </a:txBody>
+                  <a:tcPr marL="9525" marR="9525" marT="9525" marB="0" anchor="b"/>
+                </a:tc>
+                <a:tc>
+                  <a:txBody>
+                    <a:bodyPr/>
+                    <a:lstStyle/>
+                    <a:p>
+                      <a:pPr algn="l" fontAlgn="b"/>
+                      <a:endParaRPr lang="en-US" sz="1200" b="0" i="0" u="none" strike="noStrike">
+                        <a:solidFill>
+                          <a:srgbClr val="000000"/>
+                        </a:solidFill>
+                        <a:effectLst/>
+                        <a:latin typeface="Calibri" panose="020F0502020204030204" pitchFamily="34" charset="0"/>
+                      </a:endParaRPr>
+                    </a:p>
+                  </a:txBody>
+                  <a:tcPr marL="9525" marR="9525" marT="9525" marB="0" anchor="b"/>
+                </a:tc>
+                <a:tc>
+                  <a:txBody>
+                    <a:bodyPr/>
+                    <a:lstStyle/>
+                    <a:p>
+                      <a:pPr algn="l" fontAlgn="b"/>
+                      <a:endParaRPr lang="en-US" sz="1200" b="0" i="0" u="none" strike="noStrike">
+                        <a:solidFill>
+                          <a:srgbClr val="000000"/>
+                        </a:solidFill>
+                        <a:effectLst/>
+                        <a:latin typeface="Calibri" panose="020F0502020204030204" pitchFamily="34" charset="0"/>
+                      </a:endParaRPr>
+                    </a:p>
+                  </a:txBody>
+                  <a:tcPr marL="9525" marR="9525" marT="9525" marB="0" anchor="b"/>
+                </a:tc>
+                <a:tc>
+                  <a:txBody>
+                    <a:bodyPr/>
+                    <a:lstStyle/>
+                    <a:p>
+                      <a:pPr algn="r" fontAlgn="b"/>
+                      <a:r>
+                        <a:rPr lang="en-US" sz="1200" u="none" strike="noStrike">
+                          <a:effectLst/>
+                        </a:rPr>
+                        <a:t>0.9053</a:t>
+                      </a:r>
+                      <a:endParaRPr lang="en-US" sz="1200" b="0" i="0" u="none" strike="noStrike">
+                        <a:solidFill>
+                          <a:srgbClr val="000000"/>
+                        </a:solidFill>
+                        <a:effectLst/>
+                        <a:latin typeface="Calibri" panose="020F0502020204030204" pitchFamily="34" charset="0"/>
+                      </a:endParaRPr>
+                    </a:p>
+                  </a:txBody>
+                  <a:tcPr marL="9525" marR="9525" marT="9525" marB="0" anchor="b"/>
+                </a:tc>
+                <a:extLst>
+                  <a:ext uri="{0D108BD9-81ED-4DB2-BD59-A6C34878D82A}">
+                    <a16:rowId xmlns:a16="http://schemas.microsoft.com/office/drawing/2014/main" val="217118530"/>
+                  </a:ext>
+                </a:extLst>
+              </a:tr>
+              <a:tr h="172559">
+                <a:tc>
+                  <a:txBody>
+                    <a:bodyPr/>
+                    <a:lstStyle/>
+                    <a:p>
+                      <a:pPr algn="l" fontAlgn="b"/>
+                      <a:r>
+                        <a:rPr lang="en-US" sz="1200" u="none" strike="noStrike">
+                          <a:effectLst/>
+                        </a:rPr>
+                        <a:t>Summer_S2_VI        </a:t>
+                      </a:r>
+                      <a:endParaRPr lang="en-US" sz="1200" b="0" i="0" u="none" strike="noStrike">
+                        <a:solidFill>
+                          <a:srgbClr val="000000"/>
+                        </a:solidFill>
+                        <a:effectLst/>
+                        <a:latin typeface="Calibri" panose="020F0502020204030204" pitchFamily="34" charset="0"/>
+                      </a:endParaRPr>
+                    </a:p>
+                  </a:txBody>
+                  <a:tcPr marL="9525" marR="9525" marT="9525" marB="0" anchor="b"/>
+                </a:tc>
+                <a:tc>
+                  <a:txBody>
+                    <a:bodyPr/>
+                    <a:lstStyle/>
+                    <a:p>
+                      <a:pPr algn="l" fontAlgn="b"/>
+                      <a:endParaRPr lang="en-US" sz="1200" b="0" i="0" u="none" strike="noStrike">
+                        <a:solidFill>
+                          <a:srgbClr val="000000"/>
+                        </a:solidFill>
+                        <a:effectLst/>
+                        <a:latin typeface="Calibri" panose="020F0502020204030204" pitchFamily="34" charset="0"/>
+                      </a:endParaRPr>
+                    </a:p>
+                  </a:txBody>
+                  <a:tcPr marL="9525" marR="9525" marT="9525" marB="0" anchor="b"/>
+                </a:tc>
+                <a:tc>
+                  <a:txBody>
+                    <a:bodyPr/>
+                    <a:lstStyle/>
+                    <a:p>
+                      <a:pPr algn="l" fontAlgn="b"/>
+                      <a:endParaRPr lang="en-US" sz="1200" b="0" i="0" u="none" strike="noStrike">
+                        <a:solidFill>
+                          <a:srgbClr val="000000"/>
+                        </a:solidFill>
+                        <a:effectLst/>
+                        <a:latin typeface="Calibri" panose="020F0502020204030204" pitchFamily="34" charset="0"/>
+                      </a:endParaRPr>
+                    </a:p>
+                  </a:txBody>
+                  <a:tcPr marL="9525" marR="9525" marT="9525" marB="0" anchor="b"/>
+                </a:tc>
+                <a:tc>
+                  <a:txBody>
+                    <a:bodyPr/>
+                    <a:lstStyle/>
+                    <a:p>
+                      <a:pPr algn="r" fontAlgn="b"/>
+                      <a:r>
+                        <a:rPr lang="en-US" sz="1200" u="none" strike="noStrike">
+                          <a:effectLst/>
+                        </a:rPr>
+                        <a:t>0.8421</a:t>
+                      </a:r>
+                      <a:endParaRPr lang="en-US" sz="1200" b="0" i="0" u="none" strike="noStrike">
+                        <a:solidFill>
+                          <a:srgbClr val="000000"/>
+                        </a:solidFill>
+                        <a:effectLst/>
+                        <a:latin typeface="Calibri" panose="020F0502020204030204" pitchFamily="34" charset="0"/>
+                      </a:endParaRPr>
+                    </a:p>
+                  </a:txBody>
+                  <a:tcPr marL="9525" marR="9525" marT="9525" marB="0" anchor="b"/>
+                </a:tc>
+                <a:extLst>
+                  <a:ext uri="{0D108BD9-81ED-4DB2-BD59-A6C34878D82A}">
+                    <a16:rowId xmlns:a16="http://schemas.microsoft.com/office/drawing/2014/main" val="1545869952"/>
+                  </a:ext>
+                </a:extLst>
+              </a:tr>
+              <a:tr h="172559">
+                <a:tc>
+                  <a:txBody>
+                    <a:bodyPr/>
+                    <a:lstStyle/>
+                    <a:p>
+                      <a:pPr algn="l" fontAlgn="b"/>
+                      <a:r>
+                        <a:rPr lang="en-US" sz="1200" u="none" strike="noStrike">
+                          <a:effectLst/>
+                        </a:rPr>
+                        <a:t>Summer_S2           </a:t>
+                      </a:r>
+                      <a:endParaRPr lang="en-US" sz="1200" b="0" i="0" u="none" strike="noStrike">
+                        <a:solidFill>
+                          <a:srgbClr val="000000"/>
+                        </a:solidFill>
+                        <a:effectLst/>
+                        <a:latin typeface="Calibri" panose="020F0502020204030204" pitchFamily="34" charset="0"/>
+                      </a:endParaRPr>
+                    </a:p>
+                  </a:txBody>
+                  <a:tcPr marL="9525" marR="9525" marT="9525" marB="0" anchor="b"/>
+                </a:tc>
+                <a:tc>
+                  <a:txBody>
+                    <a:bodyPr/>
+                    <a:lstStyle/>
+                    <a:p>
+                      <a:pPr algn="l" fontAlgn="b"/>
+                      <a:endParaRPr lang="en-US" sz="1200" b="0" i="0" u="none" strike="noStrike">
+                        <a:solidFill>
+                          <a:srgbClr val="000000"/>
+                        </a:solidFill>
+                        <a:effectLst/>
+                        <a:latin typeface="Calibri" panose="020F0502020204030204" pitchFamily="34" charset="0"/>
+                      </a:endParaRPr>
+                    </a:p>
+                  </a:txBody>
+                  <a:tcPr marL="9525" marR="9525" marT="9525" marB="0" anchor="b"/>
+                </a:tc>
+                <a:tc>
+                  <a:txBody>
+                    <a:bodyPr/>
+                    <a:lstStyle/>
+                    <a:p>
+                      <a:pPr algn="l" fontAlgn="b"/>
+                      <a:endParaRPr lang="en-US" sz="1200" b="0" i="0" u="none" strike="noStrike">
+                        <a:solidFill>
+                          <a:srgbClr val="000000"/>
+                        </a:solidFill>
+                        <a:effectLst/>
+                        <a:latin typeface="Calibri" panose="020F0502020204030204" pitchFamily="34" charset="0"/>
+                      </a:endParaRPr>
+                    </a:p>
+                  </a:txBody>
+                  <a:tcPr marL="9525" marR="9525" marT="9525" marB="0" anchor="b"/>
+                </a:tc>
+                <a:tc>
+                  <a:txBody>
+                    <a:bodyPr/>
+                    <a:lstStyle/>
+                    <a:p>
+                      <a:pPr algn="r" fontAlgn="b"/>
+                      <a:r>
+                        <a:rPr lang="en-US" sz="1200" u="none" strike="noStrike">
+                          <a:effectLst/>
+                        </a:rPr>
+                        <a:t>0.8372</a:t>
+                      </a:r>
+                      <a:endParaRPr lang="en-US" sz="1200" b="0" i="0" u="none" strike="noStrike">
+                        <a:solidFill>
+                          <a:srgbClr val="000000"/>
+                        </a:solidFill>
+                        <a:effectLst/>
+                        <a:latin typeface="Calibri" panose="020F0502020204030204" pitchFamily="34" charset="0"/>
+                      </a:endParaRPr>
+                    </a:p>
+                  </a:txBody>
+                  <a:tcPr marL="9525" marR="9525" marT="9525" marB="0" anchor="b"/>
+                </a:tc>
+                <a:extLst>
+                  <a:ext uri="{0D108BD9-81ED-4DB2-BD59-A6C34878D82A}">
+                    <a16:rowId xmlns:a16="http://schemas.microsoft.com/office/drawing/2014/main" val="1388936876"/>
+                  </a:ext>
+                </a:extLst>
+              </a:tr>
+              <a:tr h="172559">
+                <a:tc>
+                  <a:txBody>
+                    <a:bodyPr/>
+                    <a:lstStyle/>
+                    <a:p>
+                      <a:pPr algn="l" fontAlgn="b"/>
+                      <a:r>
+                        <a:rPr lang="en-US" sz="1200" u="none" strike="noStrike">
+                          <a:effectLst/>
+                        </a:rPr>
+                        <a:t>Autumn_S2_VI        </a:t>
+                      </a:r>
+                      <a:endParaRPr lang="en-US" sz="1200" b="0" i="0" u="none" strike="noStrike">
+                        <a:solidFill>
+                          <a:srgbClr val="000000"/>
+                        </a:solidFill>
+                        <a:effectLst/>
+                        <a:latin typeface="Calibri" panose="020F0502020204030204" pitchFamily="34" charset="0"/>
+                      </a:endParaRPr>
+                    </a:p>
+                  </a:txBody>
+                  <a:tcPr marL="9525" marR="9525" marT="9525" marB="0" anchor="b"/>
+                </a:tc>
+                <a:tc>
+                  <a:txBody>
+                    <a:bodyPr/>
+                    <a:lstStyle/>
+                    <a:p>
+                      <a:pPr algn="l" fontAlgn="b"/>
+                      <a:endParaRPr lang="en-US" sz="1200" b="0" i="0" u="none" strike="noStrike">
+                        <a:solidFill>
+                          <a:srgbClr val="000000"/>
+                        </a:solidFill>
+                        <a:effectLst/>
+                        <a:latin typeface="Calibri" panose="020F0502020204030204" pitchFamily="34" charset="0"/>
+                      </a:endParaRPr>
+                    </a:p>
+                  </a:txBody>
+                  <a:tcPr marL="9525" marR="9525" marT="9525" marB="0" anchor="b"/>
+                </a:tc>
+                <a:tc>
+                  <a:txBody>
+                    <a:bodyPr/>
+                    <a:lstStyle/>
+                    <a:p>
+                      <a:pPr algn="l" fontAlgn="b"/>
+                      <a:endParaRPr lang="en-US" sz="1200" b="0" i="0" u="none" strike="noStrike">
+                        <a:solidFill>
+                          <a:srgbClr val="000000"/>
+                        </a:solidFill>
+                        <a:effectLst/>
+                        <a:latin typeface="Calibri" panose="020F0502020204030204" pitchFamily="34" charset="0"/>
+                      </a:endParaRPr>
+                    </a:p>
+                  </a:txBody>
+                  <a:tcPr marL="9525" marR="9525" marT="9525" marB="0" anchor="b"/>
+                </a:tc>
+                <a:tc>
+                  <a:txBody>
+                    <a:bodyPr/>
+                    <a:lstStyle/>
+                    <a:p>
+                      <a:pPr algn="r" fontAlgn="b"/>
+                      <a:r>
+                        <a:rPr lang="en-US" sz="1200" u="none" strike="noStrike">
+                          <a:effectLst/>
+                        </a:rPr>
+                        <a:t>0.8198</a:t>
+                      </a:r>
+                      <a:endParaRPr lang="en-US" sz="1200" b="0" i="0" u="none" strike="noStrike">
+                        <a:solidFill>
+                          <a:srgbClr val="000000"/>
+                        </a:solidFill>
+                        <a:effectLst/>
+                        <a:latin typeface="Calibri" panose="020F0502020204030204" pitchFamily="34" charset="0"/>
+                      </a:endParaRPr>
+                    </a:p>
+                  </a:txBody>
+                  <a:tcPr marL="9525" marR="9525" marT="9525" marB="0" anchor="b"/>
+                </a:tc>
+                <a:extLst>
+                  <a:ext uri="{0D108BD9-81ED-4DB2-BD59-A6C34878D82A}">
+                    <a16:rowId xmlns:a16="http://schemas.microsoft.com/office/drawing/2014/main" val="3179122670"/>
+                  </a:ext>
+                </a:extLst>
+              </a:tr>
+              <a:tr h="172559">
+                <a:tc>
+                  <a:txBody>
+                    <a:bodyPr/>
+                    <a:lstStyle/>
+                    <a:p>
+                      <a:pPr algn="l" fontAlgn="b"/>
+                      <a:r>
+                        <a:rPr lang="en-US" sz="1200" u="none" strike="noStrike">
+                          <a:effectLst/>
+                        </a:rPr>
+                        <a:t>Autumn_S2          </a:t>
+                      </a:r>
+                      <a:endParaRPr lang="en-US" sz="1200" b="0" i="0" u="none" strike="noStrike">
+                        <a:solidFill>
+                          <a:srgbClr val="000000"/>
+                        </a:solidFill>
+                        <a:effectLst/>
+                        <a:latin typeface="Calibri" panose="020F0502020204030204" pitchFamily="34" charset="0"/>
+                      </a:endParaRPr>
+                    </a:p>
+                  </a:txBody>
+                  <a:tcPr marL="9525" marR="9525" marT="9525" marB="0" anchor="b"/>
+                </a:tc>
+                <a:tc>
+                  <a:txBody>
+                    <a:bodyPr/>
+                    <a:lstStyle/>
+                    <a:p>
+                      <a:pPr algn="l" fontAlgn="b"/>
+                      <a:endParaRPr lang="en-US" sz="1200" b="0" i="0" u="none" strike="noStrike">
+                        <a:solidFill>
+                          <a:srgbClr val="000000"/>
+                        </a:solidFill>
+                        <a:effectLst/>
+                        <a:latin typeface="Calibri" panose="020F0502020204030204" pitchFamily="34" charset="0"/>
+                      </a:endParaRPr>
+                    </a:p>
+                  </a:txBody>
+                  <a:tcPr marL="9525" marR="9525" marT="9525" marB="0" anchor="b"/>
+                </a:tc>
+                <a:tc>
+                  <a:txBody>
+                    <a:bodyPr/>
+                    <a:lstStyle/>
+                    <a:p>
+                      <a:pPr algn="l" fontAlgn="b"/>
+                      <a:endParaRPr lang="en-US" sz="1200" b="0" i="0" u="none" strike="noStrike">
+                        <a:solidFill>
+                          <a:srgbClr val="000000"/>
+                        </a:solidFill>
+                        <a:effectLst/>
+                        <a:latin typeface="Calibri" panose="020F0502020204030204" pitchFamily="34" charset="0"/>
+                      </a:endParaRPr>
+                    </a:p>
+                  </a:txBody>
+                  <a:tcPr marL="9525" marR="9525" marT="9525" marB="0" anchor="b"/>
+                </a:tc>
+                <a:tc>
+                  <a:txBody>
+                    <a:bodyPr/>
+                    <a:lstStyle/>
+                    <a:p>
+                      <a:pPr algn="r" fontAlgn="b"/>
+                      <a:r>
+                        <a:rPr lang="en-US" sz="1200" u="none" strike="noStrike">
+                          <a:effectLst/>
+                        </a:rPr>
+                        <a:t>0.8049</a:t>
+                      </a:r>
+                      <a:endParaRPr lang="en-US" sz="1200" b="0" i="0" u="none" strike="noStrike">
+                        <a:solidFill>
+                          <a:srgbClr val="000000"/>
+                        </a:solidFill>
+                        <a:effectLst/>
+                        <a:latin typeface="Calibri" panose="020F0502020204030204" pitchFamily="34" charset="0"/>
+                      </a:endParaRPr>
+                    </a:p>
+                  </a:txBody>
+                  <a:tcPr marL="9525" marR="9525" marT="9525" marB="0" anchor="b"/>
+                </a:tc>
+                <a:extLst>
+                  <a:ext uri="{0D108BD9-81ED-4DB2-BD59-A6C34878D82A}">
+                    <a16:rowId xmlns:a16="http://schemas.microsoft.com/office/drawing/2014/main" val="1366214137"/>
+                  </a:ext>
+                </a:extLst>
+              </a:tr>
+              <a:tr h="172559">
+                <a:tc>
+                  <a:txBody>
+                    <a:bodyPr/>
+                    <a:lstStyle/>
+                    <a:p>
+                      <a:pPr algn="l" fontAlgn="b"/>
+                      <a:r>
+                        <a:rPr lang="en-US" sz="1200" u="none" strike="noStrike">
+                          <a:effectLst/>
+                        </a:rPr>
+                        <a:t>Summer_Winter_S1   </a:t>
+                      </a:r>
+                      <a:endParaRPr lang="en-US" sz="1200" b="0" i="0" u="none" strike="noStrike">
+                        <a:solidFill>
+                          <a:srgbClr val="000000"/>
+                        </a:solidFill>
+                        <a:effectLst/>
+                        <a:latin typeface="Calibri" panose="020F0502020204030204" pitchFamily="34" charset="0"/>
+                      </a:endParaRPr>
+                    </a:p>
+                  </a:txBody>
+                  <a:tcPr marL="9525" marR="9525" marT="9525" marB="0" anchor="b"/>
+                </a:tc>
+                <a:tc>
+                  <a:txBody>
+                    <a:bodyPr/>
+                    <a:lstStyle/>
+                    <a:p>
+                      <a:pPr algn="l" fontAlgn="b"/>
+                      <a:endParaRPr lang="en-US" sz="1200" b="0" i="0" u="none" strike="noStrike">
+                        <a:solidFill>
+                          <a:srgbClr val="000000"/>
+                        </a:solidFill>
+                        <a:effectLst/>
+                        <a:latin typeface="Calibri" panose="020F0502020204030204" pitchFamily="34" charset="0"/>
+                      </a:endParaRPr>
+                    </a:p>
+                  </a:txBody>
+                  <a:tcPr marL="9525" marR="9525" marT="9525" marB="0" anchor="b"/>
+                </a:tc>
+                <a:tc>
+                  <a:txBody>
+                    <a:bodyPr/>
+                    <a:lstStyle/>
+                    <a:p>
+                      <a:pPr algn="l" fontAlgn="b"/>
+                      <a:endParaRPr lang="en-US" sz="1200" b="0" i="0" u="none" strike="noStrike">
+                        <a:solidFill>
+                          <a:srgbClr val="000000"/>
+                        </a:solidFill>
+                        <a:effectLst/>
+                        <a:latin typeface="Calibri" panose="020F0502020204030204" pitchFamily="34" charset="0"/>
+                      </a:endParaRPr>
+                    </a:p>
+                  </a:txBody>
+                  <a:tcPr marL="9525" marR="9525" marT="9525" marB="0" anchor="b"/>
+                </a:tc>
+                <a:tc>
+                  <a:txBody>
+                    <a:bodyPr/>
+                    <a:lstStyle/>
+                    <a:p>
+                      <a:pPr algn="r" fontAlgn="b"/>
+                      <a:r>
+                        <a:rPr lang="en-US" sz="1200" u="none" strike="noStrike">
+                          <a:effectLst/>
+                        </a:rPr>
+                        <a:t>0.5574</a:t>
+                      </a:r>
+                      <a:endParaRPr lang="en-US" sz="1200" b="0" i="0" u="none" strike="noStrike">
+                        <a:solidFill>
+                          <a:srgbClr val="000000"/>
+                        </a:solidFill>
+                        <a:effectLst/>
+                        <a:latin typeface="Calibri" panose="020F0502020204030204" pitchFamily="34" charset="0"/>
+                      </a:endParaRPr>
+                    </a:p>
+                  </a:txBody>
+                  <a:tcPr marL="9525" marR="9525" marT="9525" marB="0" anchor="b"/>
+                </a:tc>
+                <a:extLst>
+                  <a:ext uri="{0D108BD9-81ED-4DB2-BD59-A6C34878D82A}">
+                    <a16:rowId xmlns:a16="http://schemas.microsoft.com/office/drawing/2014/main" val="4049814390"/>
+                  </a:ext>
+                </a:extLst>
+              </a:tr>
+              <a:tr h="172559">
+                <a:tc>
+                  <a:txBody>
+                    <a:bodyPr/>
+                    <a:lstStyle/>
+                    <a:p>
+                      <a:pPr algn="l" fontAlgn="b"/>
+                      <a:r>
+                        <a:rPr lang="en-US" sz="1200" u="none" strike="noStrike">
+                          <a:effectLst/>
+                        </a:rPr>
+                        <a:t>Winter_S1_GLCM     </a:t>
+                      </a:r>
+                      <a:endParaRPr lang="en-US" sz="1200" b="0" i="0" u="none" strike="noStrike">
+                        <a:solidFill>
+                          <a:srgbClr val="000000"/>
+                        </a:solidFill>
+                        <a:effectLst/>
+                        <a:latin typeface="Calibri" panose="020F0502020204030204" pitchFamily="34" charset="0"/>
+                      </a:endParaRPr>
+                    </a:p>
+                  </a:txBody>
+                  <a:tcPr marL="9525" marR="9525" marT="9525" marB="0" anchor="b"/>
+                </a:tc>
+                <a:tc>
+                  <a:txBody>
+                    <a:bodyPr/>
+                    <a:lstStyle/>
+                    <a:p>
+                      <a:pPr algn="l" fontAlgn="b"/>
+                      <a:endParaRPr lang="en-US" sz="1200" b="0" i="0" u="none" strike="noStrike">
+                        <a:solidFill>
+                          <a:srgbClr val="000000"/>
+                        </a:solidFill>
+                        <a:effectLst/>
+                        <a:latin typeface="Calibri" panose="020F0502020204030204" pitchFamily="34" charset="0"/>
+                      </a:endParaRPr>
+                    </a:p>
+                  </a:txBody>
+                  <a:tcPr marL="9525" marR="9525" marT="9525" marB="0" anchor="b"/>
+                </a:tc>
+                <a:tc>
+                  <a:txBody>
+                    <a:bodyPr/>
+                    <a:lstStyle/>
+                    <a:p>
+                      <a:pPr algn="l" fontAlgn="b"/>
+                      <a:endParaRPr lang="en-US" sz="1200" b="0" i="0" u="none" strike="noStrike">
+                        <a:solidFill>
+                          <a:srgbClr val="000000"/>
+                        </a:solidFill>
+                        <a:effectLst/>
+                        <a:latin typeface="Calibri" panose="020F0502020204030204" pitchFamily="34" charset="0"/>
+                      </a:endParaRPr>
+                    </a:p>
+                  </a:txBody>
+                  <a:tcPr marL="9525" marR="9525" marT="9525" marB="0" anchor="b"/>
+                </a:tc>
+                <a:tc>
+                  <a:txBody>
+                    <a:bodyPr/>
+                    <a:lstStyle/>
+                    <a:p>
+                      <a:pPr algn="r" fontAlgn="b"/>
+                      <a:r>
+                        <a:rPr lang="en-US" sz="1200" u="none" strike="noStrike">
+                          <a:effectLst/>
+                        </a:rPr>
+                        <a:t>0.4857</a:t>
+                      </a:r>
+                      <a:endParaRPr lang="en-US" sz="1200" b="0" i="0" u="none" strike="noStrike">
+                        <a:solidFill>
+                          <a:srgbClr val="000000"/>
+                        </a:solidFill>
+                        <a:effectLst/>
+                        <a:latin typeface="Calibri" panose="020F0502020204030204" pitchFamily="34" charset="0"/>
+                      </a:endParaRPr>
+                    </a:p>
+                  </a:txBody>
+                  <a:tcPr marL="9525" marR="9525" marT="9525" marB="0" anchor="b"/>
+                </a:tc>
+                <a:extLst>
+                  <a:ext uri="{0D108BD9-81ED-4DB2-BD59-A6C34878D82A}">
+                    <a16:rowId xmlns:a16="http://schemas.microsoft.com/office/drawing/2014/main" val="2378539736"/>
+                  </a:ext>
+                </a:extLst>
+              </a:tr>
+              <a:tr h="172559">
+                <a:tc>
+                  <a:txBody>
+                    <a:bodyPr/>
+                    <a:lstStyle/>
+                    <a:p>
+                      <a:pPr algn="l" fontAlgn="b"/>
+                      <a:r>
+                        <a:rPr lang="en-US" sz="1200" u="none" strike="noStrike">
+                          <a:effectLst/>
+                        </a:rPr>
+                        <a:t>Winter_S1           </a:t>
+                      </a:r>
+                      <a:endParaRPr lang="en-US" sz="1200" b="0" i="0" u="none" strike="noStrike">
+                        <a:solidFill>
+                          <a:srgbClr val="000000"/>
+                        </a:solidFill>
+                        <a:effectLst/>
+                        <a:latin typeface="Calibri" panose="020F0502020204030204" pitchFamily="34" charset="0"/>
+                      </a:endParaRPr>
+                    </a:p>
+                  </a:txBody>
+                  <a:tcPr marL="9525" marR="9525" marT="9525" marB="0" anchor="b"/>
+                </a:tc>
+                <a:tc>
+                  <a:txBody>
+                    <a:bodyPr/>
+                    <a:lstStyle/>
+                    <a:p>
+                      <a:pPr algn="l" fontAlgn="b"/>
+                      <a:endParaRPr lang="en-US" sz="1200" b="0" i="0" u="none" strike="noStrike">
+                        <a:solidFill>
+                          <a:srgbClr val="000000"/>
+                        </a:solidFill>
+                        <a:effectLst/>
+                        <a:latin typeface="Calibri" panose="020F0502020204030204" pitchFamily="34" charset="0"/>
+                      </a:endParaRPr>
+                    </a:p>
+                  </a:txBody>
+                  <a:tcPr marL="9525" marR="9525" marT="9525" marB="0" anchor="b"/>
+                </a:tc>
+                <a:tc>
+                  <a:txBody>
+                    <a:bodyPr/>
+                    <a:lstStyle/>
+                    <a:p>
+                      <a:pPr algn="l" fontAlgn="b"/>
+                      <a:endParaRPr lang="en-US" sz="1200" b="0" i="0" u="none" strike="noStrike">
+                        <a:solidFill>
+                          <a:srgbClr val="000000"/>
+                        </a:solidFill>
+                        <a:effectLst/>
+                        <a:latin typeface="Calibri" panose="020F0502020204030204" pitchFamily="34" charset="0"/>
+                      </a:endParaRPr>
+                    </a:p>
+                  </a:txBody>
+                  <a:tcPr marL="9525" marR="9525" marT="9525" marB="0" anchor="b"/>
+                </a:tc>
+                <a:tc>
+                  <a:txBody>
+                    <a:bodyPr/>
+                    <a:lstStyle/>
+                    <a:p>
+                      <a:pPr algn="r" fontAlgn="b"/>
+                      <a:r>
+                        <a:rPr lang="en-US" sz="1200" u="none" strike="noStrike">
+                          <a:effectLst/>
+                        </a:rPr>
+                        <a:t>0.4629</a:t>
+                      </a:r>
+                      <a:endParaRPr lang="en-US" sz="1200" b="0" i="0" u="none" strike="noStrike">
+                        <a:solidFill>
+                          <a:srgbClr val="000000"/>
+                        </a:solidFill>
+                        <a:effectLst/>
+                        <a:latin typeface="Calibri" panose="020F0502020204030204" pitchFamily="34" charset="0"/>
+                      </a:endParaRPr>
+                    </a:p>
+                  </a:txBody>
+                  <a:tcPr marL="9525" marR="9525" marT="9525" marB="0" anchor="b"/>
+                </a:tc>
+                <a:extLst>
+                  <a:ext uri="{0D108BD9-81ED-4DB2-BD59-A6C34878D82A}">
+                    <a16:rowId xmlns:a16="http://schemas.microsoft.com/office/drawing/2014/main" val="707076986"/>
+                  </a:ext>
+                </a:extLst>
+              </a:tr>
+              <a:tr h="172559">
+                <a:tc>
+                  <a:txBody>
+                    <a:bodyPr/>
+                    <a:lstStyle/>
+                    <a:p>
+                      <a:pPr algn="l" fontAlgn="b"/>
+                      <a:r>
+                        <a:rPr lang="en-US" sz="1200" u="none" strike="noStrike">
+                          <a:effectLst/>
+                        </a:rPr>
+                        <a:t>Summer_S1_GLCM      </a:t>
+                      </a:r>
+                      <a:endParaRPr lang="en-US" sz="1200" b="0" i="0" u="none" strike="noStrike">
+                        <a:solidFill>
+                          <a:srgbClr val="000000"/>
+                        </a:solidFill>
+                        <a:effectLst/>
+                        <a:latin typeface="Calibri" panose="020F0502020204030204" pitchFamily="34" charset="0"/>
+                      </a:endParaRPr>
+                    </a:p>
+                  </a:txBody>
+                  <a:tcPr marL="9525" marR="9525" marT="9525" marB="0" anchor="b"/>
+                </a:tc>
+                <a:tc>
+                  <a:txBody>
+                    <a:bodyPr/>
+                    <a:lstStyle/>
+                    <a:p>
+                      <a:pPr algn="l" fontAlgn="b"/>
+                      <a:endParaRPr lang="en-US" sz="1200" b="0" i="0" u="none" strike="noStrike">
+                        <a:solidFill>
+                          <a:srgbClr val="000000"/>
+                        </a:solidFill>
+                        <a:effectLst/>
+                        <a:latin typeface="Calibri" panose="020F0502020204030204" pitchFamily="34" charset="0"/>
+                      </a:endParaRPr>
+                    </a:p>
+                  </a:txBody>
+                  <a:tcPr marL="9525" marR="9525" marT="9525" marB="0" anchor="b"/>
+                </a:tc>
+                <a:tc>
+                  <a:txBody>
+                    <a:bodyPr/>
+                    <a:lstStyle/>
+                    <a:p>
+                      <a:pPr algn="l" fontAlgn="b"/>
+                      <a:endParaRPr lang="en-US" sz="1200" b="0" i="0" u="none" strike="noStrike">
+                        <a:solidFill>
+                          <a:srgbClr val="000000"/>
+                        </a:solidFill>
+                        <a:effectLst/>
+                        <a:latin typeface="Calibri" panose="020F0502020204030204" pitchFamily="34" charset="0"/>
+                      </a:endParaRPr>
+                    </a:p>
+                  </a:txBody>
+                  <a:tcPr marL="9525" marR="9525" marT="9525" marB="0" anchor="b"/>
+                </a:tc>
+                <a:tc>
+                  <a:txBody>
+                    <a:bodyPr/>
+                    <a:lstStyle/>
+                    <a:p>
+                      <a:pPr algn="r" fontAlgn="b"/>
+                      <a:r>
+                        <a:rPr lang="en-US" sz="1200" u="none" strike="noStrike">
+                          <a:effectLst/>
+                        </a:rPr>
+                        <a:t>0.4531</a:t>
+                      </a:r>
+                      <a:endParaRPr lang="en-US" sz="1200" b="0" i="0" u="none" strike="noStrike">
+                        <a:solidFill>
+                          <a:srgbClr val="000000"/>
+                        </a:solidFill>
+                        <a:effectLst/>
+                        <a:latin typeface="Calibri" panose="020F0502020204030204" pitchFamily="34" charset="0"/>
+                      </a:endParaRPr>
+                    </a:p>
+                  </a:txBody>
+                  <a:tcPr marL="9525" marR="9525" marT="9525" marB="0" anchor="b"/>
+                </a:tc>
+                <a:extLst>
+                  <a:ext uri="{0D108BD9-81ED-4DB2-BD59-A6C34878D82A}">
+                    <a16:rowId xmlns:a16="http://schemas.microsoft.com/office/drawing/2014/main" val="3300075548"/>
+                  </a:ext>
+                </a:extLst>
+              </a:tr>
+              <a:tr h="172559">
+                <a:tc>
+                  <a:txBody>
+                    <a:bodyPr/>
+                    <a:lstStyle/>
+                    <a:p>
+                      <a:pPr algn="l" fontAlgn="b"/>
+                      <a:r>
+                        <a:rPr lang="en-US" sz="1200" u="none" strike="noStrike">
+                          <a:effectLst/>
+                        </a:rPr>
+                        <a:t>Summer_S1          </a:t>
+                      </a:r>
+                      <a:endParaRPr lang="en-US" sz="1200" b="0" i="0" u="none" strike="noStrike">
+                        <a:solidFill>
+                          <a:srgbClr val="000000"/>
+                        </a:solidFill>
+                        <a:effectLst/>
+                        <a:latin typeface="Calibri" panose="020F0502020204030204" pitchFamily="34" charset="0"/>
+                      </a:endParaRPr>
+                    </a:p>
+                  </a:txBody>
+                  <a:tcPr marL="9525" marR="9525" marT="9525" marB="0" anchor="b"/>
+                </a:tc>
+                <a:tc>
+                  <a:txBody>
+                    <a:bodyPr/>
+                    <a:lstStyle/>
+                    <a:p>
+                      <a:pPr algn="l" fontAlgn="b"/>
+                      <a:r>
+                        <a:rPr lang="en-US" sz="1200" u="none" strike="noStrike">
+                          <a:effectLst/>
+                        </a:rPr>
+                        <a:t> </a:t>
+                      </a:r>
+                      <a:endParaRPr lang="en-US" sz="1200" b="0" i="0" u="none" strike="noStrike">
+                        <a:solidFill>
+                          <a:srgbClr val="000000"/>
+                        </a:solidFill>
+                        <a:effectLst/>
+                        <a:latin typeface="Calibri" panose="020F0502020204030204" pitchFamily="34" charset="0"/>
+                      </a:endParaRPr>
+                    </a:p>
+                  </a:txBody>
+                  <a:tcPr marL="9525" marR="9525" marT="9525" marB="0" anchor="b"/>
+                </a:tc>
+                <a:tc>
+                  <a:txBody>
+                    <a:bodyPr/>
+                    <a:lstStyle/>
+                    <a:p>
+                      <a:pPr algn="l" fontAlgn="b"/>
+                      <a:r>
+                        <a:rPr lang="en-US" sz="1200" u="none" strike="noStrike">
+                          <a:effectLst/>
+                        </a:rPr>
+                        <a:t> </a:t>
+                      </a:r>
+                      <a:endParaRPr lang="en-US" sz="1200" b="0" i="0" u="none" strike="noStrike">
+                        <a:solidFill>
+                          <a:srgbClr val="000000"/>
+                        </a:solidFill>
+                        <a:effectLst/>
+                        <a:latin typeface="Calibri" panose="020F0502020204030204" pitchFamily="34" charset="0"/>
+                      </a:endParaRPr>
+                    </a:p>
+                  </a:txBody>
+                  <a:tcPr marL="9525" marR="9525" marT="9525" marB="0" anchor="b"/>
+                </a:tc>
+                <a:tc>
+                  <a:txBody>
+                    <a:bodyPr/>
+                    <a:lstStyle/>
+                    <a:p>
+                      <a:pPr algn="r" fontAlgn="b"/>
+                      <a:r>
+                        <a:rPr lang="en-US" sz="1200" u="none" strike="noStrike" dirty="0">
+                          <a:effectLst/>
+                        </a:rPr>
+                        <a:t>0.4065</a:t>
+                      </a:r>
+                      <a:endParaRPr lang="en-US" sz="1200" b="0" i="0" u="none" strike="noStrike" dirty="0">
+                        <a:solidFill>
+                          <a:srgbClr val="000000"/>
+                        </a:solidFill>
+                        <a:effectLst/>
+                        <a:latin typeface="Calibri" panose="020F0502020204030204" pitchFamily="34" charset="0"/>
+                      </a:endParaRPr>
+                    </a:p>
+                  </a:txBody>
+                  <a:tcPr marL="9525" marR="9525" marT="9525" marB="0" anchor="b"/>
+                </a:tc>
+                <a:extLst>
+                  <a:ext uri="{0D108BD9-81ED-4DB2-BD59-A6C34878D82A}">
+                    <a16:rowId xmlns:a16="http://schemas.microsoft.com/office/drawing/2014/main" val="2796047057"/>
+                  </a:ext>
+                </a:extLst>
+              </a:tr>
+            </a:tbl>
+          </a:graphicData>
+        </a:graphic>
+      </p:graphicFrame>
+    </p:spTree>
+    <p:extLst>
+      <p:ext uri="{BB962C8B-B14F-4D97-AF65-F5344CB8AC3E}">
+        <p14:creationId xmlns:p14="http://schemas.microsoft.com/office/powerpoint/2010/main" val="2888378435"/>
+      </p:ext>
+    </p:extLst>
+  </p:cSld>
+  <p:clrMapOvr>
+    <a:masterClrMapping/>
+  </p:clrMapOvr>
+</p:sld>
+</file>
+
 <file path=ppt/theme/theme1.xml><?xml version="1.0" encoding="utf-8"?>
 <a:theme xmlns:a="http://schemas.openxmlformats.org/drawingml/2006/main" name="Office Theme">
   <a:themeElements>

</xml_diff>

<commit_message>
Updates to code and figures
</commit_message>
<xml_diff>
--- a/Aim1/figures/FigureS1.pptx
+++ b/Aim1/figures/FigureS1.pptx
@@ -6,7 +6,6 @@
   </p:sldMasterIdLst>
   <p:sldIdLst>
     <p:sldId id="256" r:id="rId2"/>
-    <p:sldId id="257" r:id="rId3"/>
   </p:sldIdLst>
   <p:sldSz cx="6858000" cy="6858000"/>
   <p:notesSz cx="6858000" cy="9144000"/>
@@ -125,13 +124,13 @@
 <pc:chgInfo xmlns:a="http://schemas.openxmlformats.org/drawingml/2006/main" xmlns:r="http://schemas.openxmlformats.org/officeDocument/2006/relationships" xmlns:ac="http://schemas.microsoft.com/office/drawing/2013/main/command" xmlns:pc="http://schemas.microsoft.com/office/powerpoint/2013/main/command">
   <pc:docChgLst>
     <pc:chgData name="Maxwell Cook" userId="6270a8f4b8f62cae" providerId="LiveId" clId="{5A6E2A30-B753-2F4D-9590-D4F9C08F9399}"/>
-    <pc:docChg chg="custSel addSld modSld">
-      <pc:chgData name="Maxwell Cook" userId="6270a8f4b8f62cae" providerId="LiveId" clId="{5A6E2A30-B753-2F4D-9590-D4F9C08F9399}" dt="2024-01-31T01:53:21.468" v="15" actId="1076"/>
+    <pc:docChg chg="custSel addSld delSld modSld">
+      <pc:chgData name="Maxwell Cook" userId="6270a8f4b8f62cae" providerId="LiveId" clId="{5A6E2A30-B753-2F4D-9590-D4F9C08F9399}" dt="2024-02-02T21:33:17.309" v="16" actId="2696"/>
       <pc:docMkLst>
         <pc:docMk/>
       </pc:docMkLst>
-      <pc:sldChg chg="addSp delSp modSp new mod">
-        <pc:chgData name="Maxwell Cook" userId="6270a8f4b8f62cae" providerId="LiveId" clId="{5A6E2A30-B753-2F4D-9590-D4F9C08F9399}" dt="2024-01-31T01:53:21.468" v="15" actId="1076"/>
+      <pc:sldChg chg="addSp delSp modSp new del mod">
+        <pc:chgData name="Maxwell Cook" userId="6270a8f4b8f62cae" providerId="LiveId" clId="{5A6E2A30-B753-2F4D-9590-D4F9C08F9399}" dt="2024-02-02T21:33:17.309" v="16" actId="2696"/>
         <pc:sldMkLst>
           <pc:docMk/>
           <pc:sldMk cId="2888378435" sldId="257"/>
@@ -305,7 +304,7 @@
           <a:p>
             <a:fld id="{172BB8A3-3FB0-6F42-9F4A-242D73F035D9}" type="datetimeFigureOut">
               <a:rPr lang="en-US" smtClean="0"/>
-              <a:t>1/30/24</a:t>
+              <a:t>2/2/24</a:t>
             </a:fld>
             <a:endParaRPr lang="en-US"/>
           </a:p>
@@ -475,7 +474,7 @@
           <a:p>
             <a:fld id="{172BB8A3-3FB0-6F42-9F4A-242D73F035D9}" type="datetimeFigureOut">
               <a:rPr lang="en-US" smtClean="0"/>
-              <a:t>1/30/24</a:t>
+              <a:t>2/2/24</a:t>
             </a:fld>
             <a:endParaRPr lang="en-US"/>
           </a:p>
@@ -655,7 +654,7 @@
           <a:p>
             <a:fld id="{172BB8A3-3FB0-6F42-9F4A-242D73F035D9}" type="datetimeFigureOut">
               <a:rPr lang="en-US" smtClean="0"/>
-              <a:t>1/30/24</a:t>
+              <a:t>2/2/24</a:t>
             </a:fld>
             <a:endParaRPr lang="en-US"/>
           </a:p>
@@ -825,7 +824,7 @@
           <a:p>
             <a:fld id="{172BB8A3-3FB0-6F42-9F4A-242D73F035D9}" type="datetimeFigureOut">
               <a:rPr lang="en-US" smtClean="0"/>
-              <a:t>1/30/24</a:t>
+              <a:t>2/2/24</a:t>
             </a:fld>
             <a:endParaRPr lang="en-US"/>
           </a:p>
@@ -1069,7 +1068,7 @@
           <a:p>
             <a:fld id="{172BB8A3-3FB0-6F42-9F4A-242D73F035D9}" type="datetimeFigureOut">
               <a:rPr lang="en-US" smtClean="0"/>
-              <a:t>1/30/24</a:t>
+              <a:t>2/2/24</a:t>
             </a:fld>
             <a:endParaRPr lang="en-US"/>
           </a:p>
@@ -1301,7 +1300,7 @@
           <a:p>
             <a:fld id="{172BB8A3-3FB0-6F42-9F4A-242D73F035D9}" type="datetimeFigureOut">
               <a:rPr lang="en-US" smtClean="0"/>
-              <a:t>1/30/24</a:t>
+              <a:t>2/2/24</a:t>
             </a:fld>
             <a:endParaRPr lang="en-US"/>
           </a:p>
@@ -1668,7 +1667,7 @@
           <a:p>
             <a:fld id="{172BB8A3-3FB0-6F42-9F4A-242D73F035D9}" type="datetimeFigureOut">
               <a:rPr lang="en-US" smtClean="0"/>
-              <a:t>1/30/24</a:t>
+              <a:t>2/2/24</a:t>
             </a:fld>
             <a:endParaRPr lang="en-US"/>
           </a:p>
@@ -1786,7 +1785,7 @@
           <a:p>
             <a:fld id="{172BB8A3-3FB0-6F42-9F4A-242D73F035D9}" type="datetimeFigureOut">
               <a:rPr lang="en-US" smtClean="0"/>
-              <a:t>1/30/24</a:t>
+              <a:t>2/2/24</a:t>
             </a:fld>
             <a:endParaRPr lang="en-US"/>
           </a:p>
@@ -1881,7 +1880,7 @@
           <a:p>
             <a:fld id="{172BB8A3-3FB0-6F42-9F4A-242D73F035D9}" type="datetimeFigureOut">
               <a:rPr lang="en-US" smtClean="0"/>
-              <a:t>1/30/24</a:t>
+              <a:t>2/2/24</a:t>
             </a:fld>
             <a:endParaRPr lang="en-US"/>
           </a:p>
@@ -2158,7 +2157,7 @@
           <a:p>
             <a:fld id="{172BB8A3-3FB0-6F42-9F4A-242D73F035D9}" type="datetimeFigureOut">
               <a:rPr lang="en-US" smtClean="0"/>
-              <a:t>1/30/24</a:t>
+              <a:t>2/2/24</a:t>
             </a:fld>
             <a:endParaRPr lang="en-US"/>
           </a:p>
@@ -2415,7 +2414,7 @@
           <a:p>
             <a:fld id="{172BB8A3-3FB0-6F42-9F4A-242D73F035D9}" type="datetimeFigureOut">
               <a:rPr lang="en-US" smtClean="0"/>
-              <a:t>1/30/24</a:t>
+              <a:t>2/2/24</a:t>
             </a:fld>
             <a:endParaRPr lang="en-US"/>
           </a:p>
@@ -2628,7 +2627,7 @@
           <a:p>
             <a:fld id="{172BB8A3-3FB0-6F42-9F4A-242D73F035D9}" type="datetimeFigureOut">
               <a:rPr lang="en-US" smtClean="0"/>
-              <a:t>1/30/24</a:t>
+              <a:t>2/2/24</a:t>
             </a:fld>
             <a:endParaRPr lang="en-US"/>
           </a:p>
@@ -3127,1204 +3126,6 @@
 </p:sld>
 </file>
 
-<file path=ppt/slides/slide2.xml><?xml version="1.0" encoding="utf-8"?>
-<p:sld xmlns:a="http://schemas.openxmlformats.org/drawingml/2006/main" xmlns:r="http://schemas.openxmlformats.org/officeDocument/2006/relationships" xmlns:p="http://schemas.openxmlformats.org/presentationml/2006/main">
-  <p:cSld>
-    <p:spTree>
-      <p:nvGrpSpPr>
-        <p:cNvPr id="1" name=""/>
-        <p:cNvGrpSpPr/>
-        <p:nvPr/>
-      </p:nvGrpSpPr>
-      <p:grpSpPr>
-        <a:xfrm>
-          <a:off x="0" y="0"/>
-          <a:ext cx="0" cy="0"/>
-          <a:chOff x="0" y="0"/>
-          <a:chExt cx="0" cy="0"/>
-        </a:xfrm>
-      </p:grpSpPr>
-      <p:pic>
-        <p:nvPicPr>
-          <p:cNvPr id="5" name="Picture 4" descr="A graph with blue and black squares&#10;&#10;Description automatically generated with medium confidence">
-            <a:extLst>
-              <a:ext uri="{FF2B5EF4-FFF2-40B4-BE49-F238E27FC236}">
-                <a16:creationId xmlns:a16="http://schemas.microsoft.com/office/drawing/2014/main" id="{85B71408-9E8A-771A-7485-89082BEE5ACA}"/>
-              </a:ext>
-            </a:extLst>
-          </p:cNvPr>
-          <p:cNvPicPr>
-            <a:picLocks noChangeAspect="1"/>
-          </p:cNvPicPr>
-          <p:nvPr/>
-        </p:nvPicPr>
-        <p:blipFill>
-          <a:blip r:embed="rId2"/>
-          <a:stretch>
-            <a:fillRect/>
-          </a:stretch>
-        </p:blipFill>
-        <p:spPr>
-          <a:xfrm>
-            <a:off x="0" y="0"/>
-            <a:ext cx="3581401" cy="3581401"/>
-          </a:xfrm>
-          <a:prstGeom prst="rect">
-            <a:avLst/>
-          </a:prstGeom>
-        </p:spPr>
-      </p:pic>
-      <p:graphicFrame>
-        <p:nvGraphicFramePr>
-          <p:cNvPr id="6" name="Table 5">
-            <a:extLst>
-              <a:ext uri="{FF2B5EF4-FFF2-40B4-BE49-F238E27FC236}">
-                <a16:creationId xmlns:a16="http://schemas.microsoft.com/office/drawing/2014/main" id="{64F8CBCD-ADCD-77EC-920C-F630C82B5345}"/>
-              </a:ext>
-            </a:extLst>
-          </p:cNvPr>
-          <p:cNvGraphicFramePr>
-            <a:graphicFrameLocks noGrp="1"/>
-          </p:cNvGraphicFramePr>
-          <p:nvPr>
-            <p:extLst>
-              <p:ext uri="{D42A27DB-BD31-4B8C-83A1-F6EECF244321}">
-                <p14:modId xmlns:p14="http://schemas.microsoft.com/office/powerpoint/2010/main" val="1651012382"/>
-              </p:ext>
-            </p:extLst>
-          </p:nvPr>
-        </p:nvGraphicFramePr>
-        <p:xfrm>
-          <a:off x="3476979" y="358141"/>
-          <a:ext cx="3121378" cy="3223260"/>
-        </p:xfrm>
-        <a:graphic>
-          <a:graphicData uri="http://schemas.openxmlformats.org/drawingml/2006/table">
-            <a:tbl>
-              <a:tblPr>
-                <a:tableStyleId>{5C22544A-7EE6-4342-B048-85BDC9FD1C3A}</a:tableStyleId>
-              </a:tblPr>
-              <a:tblGrid>
-                <a:gridCol w="1156066">
-                  <a:extLst>
-                    <a:ext uri="{9D8B030D-6E8A-4147-A177-3AD203B41FA5}">
-                      <a16:colId xmlns:a16="http://schemas.microsoft.com/office/drawing/2014/main" val="2004541342"/>
-                    </a:ext>
-                  </a:extLst>
-                </a:gridCol>
-                <a:gridCol w="719330">
-                  <a:extLst>
-                    <a:ext uri="{9D8B030D-6E8A-4147-A177-3AD203B41FA5}">
-                      <a16:colId xmlns:a16="http://schemas.microsoft.com/office/drawing/2014/main" val="341115845"/>
-                    </a:ext>
-                  </a:extLst>
-                </a:gridCol>
-                <a:gridCol w="687217">
-                  <a:extLst>
-                    <a:ext uri="{9D8B030D-6E8A-4147-A177-3AD203B41FA5}">
-                      <a16:colId xmlns:a16="http://schemas.microsoft.com/office/drawing/2014/main" val="1633905556"/>
-                    </a:ext>
-                  </a:extLst>
-                </a:gridCol>
-                <a:gridCol w="558765">
-                  <a:extLst>
-                    <a:ext uri="{9D8B030D-6E8A-4147-A177-3AD203B41FA5}">
-                      <a16:colId xmlns:a16="http://schemas.microsoft.com/office/drawing/2014/main" val="463047109"/>
-                    </a:ext>
-                  </a:extLst>
-                </a:gridCol>
-              </a:tblGrid>
-              <a:tr h="442182">
-                <a:tc>
-                  <a:txBody>
-                    <a:bodyPr/>
-                    <a:lstStyle/>
-                    <a:p>
-                      <a:pPr algn="ctr" fontAlgn="ctr"/>
-                      <a:r>
-                        <a:rPr lang="en-US" sz="1200" u="none" strike="noStrike">
-                          <a:effectLst/>
-                        </a:rPr>
-                        <a:t>Classification Scenario</a:t>
-                      </a:r>
-                      <a:endParaRPr lang="en-US" sz="1200" b="1" i="0" u="none" strike="noStrike">
-                        <a:solidFill>
-                          <a:srgbClr val="000000"/>
-                        </a:solidFill>
-                        <a:effectLst/>
-                        <a:latin typeface="Calibri" panose="020F0502020204030204" pitchFamily="34" charset="0"/>
-                      </a:endParaRPr>
-                    </a:p>
-                  </a:txBody>
-                  <a:tcPr marL="9525" marR="9525" marT="9525" marB="0" anchor="ctr"/>
-                </a:tc>
-                <a:tc>
-                  <a:txBody>
-                    <a:bodyPr/>
-                    <a:lstStyle/>
-                    <a:p>
-                      <a:pPr algn="ctr" fontAlgn="ctr"/>
-                      <a:r>
-                        <a:rPr lang="en-US" sz="1200" u="none" strike="noStrike">
-                          <a:effectLst/>
-                        </a:rPr>
-                        <a:t>Description</a:t>
-                      </a:r>
-                      <a:endParaRPr lang="en-US" sz="1200" b="1" i="0" u="none" strike="noStrike">
-                        <a:solidFill>
-                          <a:srgbClr val="000000"/>
-                        </a:solidFill>
-                        <a:effectLst/>
-                        <a:latin typeface="Calibri" panose="020F0502020204030204" pitchFamily="34" charset="0"/>
-                      </a:endParaRPr>
-                    </a:p>
-                  </a:txBody>
-                  <a:tcPr marL="9525" marR="9525" marT="9525" marB="0" anchor="ctr"/>
-                </a:tc>
-                <a:tc>
-                  <a:txBody>
-                    <a:bodyPr/>
-                    <a:lstStyle/>
-                    <a:p>
-                      <a:pPr algn="ctr" fontAlgn="ctr"/>
-                      <a:r>
-                        <a:rPr lang="en-US" sz="1200" u="none" strike="noStrike">
-                          <a:effectLst/>
-                        </a:rPr>
-                        <a:t>Number of Features</a:t>
-                      </a:r>
-                      <a:endParaRPr lang="en-US" sz="1200" b="1" i="0" u="none" strike="noStrike">
-                        <a:solidFill>
-                          <a:srgbClr val="000000"/>
-                        </a:solidFill>
-                        <a:effectLst/>
-                        <a:latin typeface="Calibri" panose="020F0502020204030204" pitchFamily="34" charset="0"/>
-                      </a:endParaRPr>
-                    </a:p>
-                  </a:txBody>
-                  <a:tcPr marL="9525" marR="9525" marT="9525" marB="0" anchor="ctr"/>
-                </a:tc>
-                <a:tc>
-                  <a:txBody>
-                    <a:bodyPr/>
-                    <a:lstStyle/>
-                    <a:p>
-                      <a:pPr algn="ctr" fontAlgn="ctr"/>
-                      <a:r>
-                        <a:rPr lang="en-US" sz="1200" u="none" strike="noStrike">
-                          <a:effectLst/>
-                        </a:rPr>
-                        <a:t>F1-Score</a:t>
-                      </a:r>
-                      <a:endParaRPr lang="en-US" sz="1200" b="1" i="0" u="none" strike="noStrike">
-                        <a:solidFill>
-                          <a:srgbClr val="000000"/>
-                        </a:solidFill>
-                        <a:effectLst/>
-                        <a:latin typeface="Calibri" panose="020F0502020204030204" pitchFamily="34" charset="0"/>
-                      </a:endParaRPr>
-                    </a:p>
-                  </a:txBody>
-                  <a:tcPr marL="9525" marR="9525" marT="9525" marB="0" anchor="ctr"/>
-                </a:tc>
-                <a:extLst>
-                  <a:ext uri="{0D108BD9-81ED-4DB2-BD59-A6C34878D82A}">
-                    <a16:rowId xmlns:a16="http://schemas.microsoft.com/office/drawing/2014/main" val="3853757388"/>
-                  </a:ext>
-                </a:extLst>
-              </a:tr>
-              <a:tr h="172559">
-                <a:tc>
-                  <a:txBody>
-                    <a:bodyPr/>
-                    <a:lstStyle/>
-                    <a:p>
-                      <a:pPr algn="l" fontAlgn="b"/>
-                      <a:r>
-                        <a:rPr lang="en-US" sz="1200" u="none" strike="noStrike">
-                          <a:effectLst/>
-                        </a:rPr>
-                        <a:t>Combined_S1_S2    </a:t>
-                      </a:r>
-                      <a:endParaRPr lang="en-US" sz="1200" b="0" i="0" u="none" strike="noStrike">
-                        <a:solidFill>
-                          <a:srgbClr val="000000"/>
-                        </a:solidFill>
-                        <a:effectLst/>
-                        <a:latin typeface="Calibri" panose="020F0502020204030204" pitchFamily="34" charset="0"/>
-                      </a:endParaRPr>
-                    </a:p>
-                  </a:txBody>
-                  <a:tcPr marL="9525" marR="9525" marT="9525" marB="0" anchor="b"/>
-                </a:tc>
-                <a:tc>
-                  <a:txBody>
-                    <a:bodyPr/>
-                    <a:lstStyle/>
-                    <a:p>
-                      <a:pPr algn="l" fontAlgn="b"/>
-                      <a:endParaRPr lang="en-US" sz="1200" b="0" i="0" u="none" strike="noStrike">
-                        <a:solidFill>
-                          <a:srgbClr val="000000"/>
-                        </a:solidFill>
-                        <a:effectLst/>
-                        <a:latin typeface="Calibri" panose="020F0502020204030204" pitchFamily="34" charset="0"/>
-                      </a:endParaRPr>
-                    </a:p>
-                  </a:txBody>
-                  <a:tcPr marL="9525" marR="9525" marT="9525" marB="0" anchor="b"/>
-                </a:tc>
-                <a:tc>
-                  <a:txBody>
-                    <a:bodyPr/>
-                    <a:lstStyle/>
-                    <a:p>
-                      <a:pPr algn="r" fontAlgn="b"/>
-                      <a:r>
-                        <a:rPr lang="en-US" sz="1200" u="none" strike="noStrike">
-                          <a:effectLst/>
-                        </a:rPr>
-                        <a:t>55</a:t>
-                      </a:r>
-                      <a:endParaRPr lang="en-US" sz="1200" b="0" i="0" u="none" strike="noStrike">
-                        <a:solidFill>
-                          <a:srgbClr val="000000"/>
-                        </a:solidFill>
-                        <a:effectLst/>
-                        <a:latin typeface="Calibri" panose="020F0502020204030204" pitchFamily="34" charset="0"/>
-                      </a:endParaRPr>
-                    </a:p>
-                  </a:txBody>
-                  <a:tcPr marL="9525" marR="9525" marT="9525" marB="0" anchor="b"/>
-                </a:tc>
-                <a:tc>
-                  <a:txBody>
-                    <a:bodyPr/>
-                    <a:lstStyle/>
-                    <a:p>
-                      <a:pPr algn="r" fontAlgn="b"/>
-                      <a:r>
-                        <a:rPr lang="en-US" sz="1200" u="none" strike="noStrike">
-                          <a:effectLst/>
-                        </a:rPr>
-                        <a:t>0.9143</a:t>
-                      </a:r>
-                      <a:endParaRPr lang="en-US" sz="1200" b="0" i="0" u="none" strike="noStrike">
-                        <a:solidFill>
-                          <a:srgbClr val="000000"/>
-                        </a:solidFill>
-                        <a:effectLst/>
-                        <a:latin typeface="Calibri" panose="020F0502020204030204" pitchFamily="34" charset="0"/>
-                      </a:endParaRPr>
-                    </a:p>
-                  </a:txBody>
-                  <a:tcPr marL="9525" marR="9525" marT="9525" marB="0" anchor="b"/>
-                </a:tc>
-                <a:extLst>
-                  <a:ext uri="{0D108BD9-81ED-4DB2-BD59-A6C34878D82A}">
-                    <a16:rowId xmlns:a16="http://schemas.microsoft.com/office/drawing/2014/main" val="2856201742"/>
-                  </a:ext>
-                </a:extLst>
-              </a:tr>
-              <a:tr h="172559">
-                <a:tc>
-                  <a:txBody>
-                    <a:bodyPr/>
-                    <a:lstStyle/>
-                    <a:p>
-                      <a:pPr algn="l" fontAlgn="b"/>
-                      <a:r>
-                        <a:rPr lang="en-US" sz="1200" u="none" strike="noStrike">
-                          <a:effectLst/>
-                        </a:rPr>
-                        <a:t>Summer_Autumn_S2   </a:t>
-                      </a:r>
-                      <a:endParaRPr lang="en-US" sz="1200" b="0" i="0" u="none" strike="noStrike">
-                        <a:solidFill>
-                          <a:srgbClr val="000000"/>
-                        </a:solidFill>
-                        <a:effectLst/>
-                        <a:latin typeface="Calibri" panose="020F0502020204030204" pitchFamily="34" charset="0"/>
-                      </a:endParaRPr>
-                    </a:p>
-                  </a:txBody>
-                  <a:tcPr marL="9525" marR="9525" marT="9525" marB="0" anchor="b"/>
-                </a:tc>
-                <a:tc>
-                  <a:txBody>
-                    <a:bodyPr/>
-                    <a:lstStyle/>
-                    <a:p>
-                      <a:pPr algn="l" fontAlgn="b"/>
-                      <a:endParaRPr lang="en-US" sz="1200" b="0" i="0" u="none" strike="noStrike">
-                        <a:solidFill>
-                          <a:srgbClr val="000000"/>
-                        </a:solidFill>
-                        <a:effectLst/>
-                        <a:latin typeface="Calibri" panose="020F0502020204030204" pitchFamily="34" charset="0"/>
-                      </a:endParaRPr>
-                    </a:p>
-                  </a:txBody>
-                  <a:tcPr marL="9525" marR="9525" marT="9525" marB="0" anchor="b"/>
-                </a:tc>
-                <a:tc>
-                  <a:txBody>
-                    <a:bodyPr/>
-                    <a:lstStyle/>
-                    <a:p>
-                      <a:pPr algn="l" fontAlgn="b"/>
-                      <a:endParaRPr lang="en-US" sz="1200" b="0" i="0" u="none" strike="noStrike">
-                        <a:solidFill>
-                          <a:srgbClr val="000000"/>
-                        </a:solidFill>
-                        <a:effectLst/>
-                        <a:latin typeface="Calibri" panose="020F0502020204030204" pitchFamily="34" charset="0"/>
-                      </a:endParaRPr>
-                    </a:p>
-                  </a:txBody>
-                  <a:tcPr marL="9525" marR="9525" marT="9525" marB="0" anchor="b"/>
-                </a:tc>
-                <a:tc>
-                  <a:txBody>
-                    <a:bodyPr/>
-                    <a:lstStyle/>
-                    <a:p>
-                      <a:pPr algn="r" fontAlgn="b"/>
-                      <a:r>
-                        <a:rPr lang="en-US" sz="1200" u="none" strike="noStrike">
-                          <a:effectLst/>
-                        </a:rPr>
-                        <a:t>0.9053</a:t>
-                      </a:r>
-                      <a:endParaRPr lang="en-US" sz="1200" b="0" i="0" u="none" strike="noStrike">
-                        <a:solidFill>
-                          <a:srgbClr val="000000"/>
-                        </a:solidFill>
-                        <a:effectLst/>
-                        <a:latin typeface="Calibri" panose="020F0502020204030204" pitchFamily="34" charset="0"/>
-                      </a:endParaRPr>
-                    </a:p>
-                  </a:txBody>
-                  <a:tcPr marL="9525" marR="9525" marT="9525" marB="0" anchor="b"/>
-                </a:tc>
-                <a:extLst>
-                  <a:ext uri="{0D108BD9-81ED-4DB2-BD59-A6C34878D82A}">
-                    <a16:rowId xmlns:a16="http://schemas.microsoft.com/office/drawing/2014/main" val="217118530"/>
-                  </a:ext>
-                </a:extLst>
-              </a:tr>
-              <a:tr h="172559">
-                <a:tc>
-                  <a:txBody>
-                    <a:bodyPr/>
-                    <a:lstStyle/>
-                    <a:p>
-                      <a:pPr algn="l" fontAlgn="b"/>
-                      <a:r>
-                        <a:rPr lang="en-US" sz="1200" u="none" strike="noStrike">
-                          <a:effectLst/>
-                        </a:rPr>
-                        <a:t>Summer_S2_VI        </a:t>
-                      </a:r>
-                      <a:endParaRPr lang="en-US" sz="1200" b="0" i="0" u="none" strike="noStrike">
-                        <a:solidFill>
-                          <a:srgbClr val="000000"/>
-                        </a:solidFill>
-                        <a:effectLst/>
-                        <a:latin typeface="Calibri" panose="020F0502020204030204" pitchFamily="34" charset="0"/>
-                      </a:endParaRPr>
-                    </a:p>
-                  </a:txBody>
-                  <a:tcPr marL="9525" marR="9525" marT="9525" marB="0" anchor="b"/>
-                </a:tc>
-                <a:tc>
-                  <a:txBody>
-                    <a:bodyPr/>
-                    <a:lstStyle/>
-                    <a:p>
-                      <a:pPr algn="l" fontAlgn="b"/>
-                      <a:endParaRPr lang="en-US" sz="1200" b="0" i="0" u="none" strike="noStrike">
-                        <a:solidFill>
-                          <a:srgbClr val="000000"/>
-                        </a:solidFill>
-                        <a:effectLst/>
-                        <a:latin typeface="Calibri" panose="020F0502020204030204" pitchFamily="34" charset="0"/>
-                      </a:endParaRPr>
-                    </a:p>
-                  </a:txBody>
-                  <a:tcPr marL="9525" marR="9525" marT="9525" marB="0" anchor="b"/>
-                </a:tc>
-                <a:tc>
-                  <a:txBody>
-                    <a:bodyPr/>
-                    <a:lstStyle/>
-                    <a:p>
-                      <a:pPr algn="l" fontAlgn="b"/>
-                      <a:endParaRPr lang="en-US" sz="1200" b="0" i="0" u="none" strike="noStrike">
-                        <a:solidFill>
-                          <a:srgbClr val="000000"/>
-                        </a:solidFill>
-                        <a:effectLst/>
-                        <a:latin typeface="Calibri" panose="020F0502020204030204" pitchFamily="34" charset="0"/>
-                      </a:endParaRPr>
-                    </a:p>
-                  </a:txBody>
-                  <a:tcPr marL="9525" marR="9525" marT="9525" marB="0" anchor="b"/>
-                </a:tc>
-                <a:tc>
-                  <a:txBody>
-                    <a:bodyPr/>
-                    <a:lstStyle/>
-                    <a:p>
-                      <a:pPr algn="r" fontAlgn="b"/>
-                      <a:r>
-                        <a:rPr lang="en-US" sz="1200" u="none" strike="noStrike">
-                          <a:effectLst/>
-                        </a:rPr>
-                        <a:t>0.8421</a:t>
-                      </a:r>
-                      <a:endParaRPr lang="en-US" sz="1200" b="0" i="0" u="none" strike="noStrike">
-                        <a:solidFill>
-                          <a:srgbClr val="000000"/>
-                        </a:solidFill>
-                        <a:effectLst/>
-                        <a:latin typeface="Calibri" panose="020F0502020204030204" pitchFamily="34" charset="0"/>
-                      </a:endParaRPr>
-                    </a:p>
-                  </a:txBody>
-                  <a:tcPr marL="9525" marR="9525" marT="9525" marB="0" anchor="b"/>
-                </a:tc>
-                <a:extLst>
-                  <a:ext uri="{0D108BD9-81ED-4DB2-BD59-A6C34878D82A}">
-                    <a16:rowId xmlns:a16="http://schemas.microsoft.com/office/drawing/2014/main" val="1545869952"/>
-                  </a:ext>
-                </a:extLst>
-              </a:tr>
-              <a:tr h="172559">
-                <a:tc>
-                  <a:txBody>
-                    <a:bodyPr/>
-                    <a:lstStyle/>
-                    <a:p>
-                      <a:pPr algn="l" fontAlgn="b"/>
-                      <a:r>
-                        <a:rPr lang="en-US" sz="1200" u="none" strike="noStrike">
-                          <a:effectLst/>
-                        </a:rPr>
-                        <a:t>Summer_S2           </a:t>
-                      </a:r>
-                      <a:endParaRPr lang="en-US" sz="1200" b="0" i="0" u="none" strike="noStrike">
-                        <a:solidFill>
-                          <a:srgbClr val="000000"/>
-                        </a:solidFill>
-                        <a:effectLst/>
-                        <a:latin typeface="Calibri" panose="020F0502020204030204" pitchFamily="34" charset="0"/>
-                      </a:endParaRPr>
-                    </a:p>
-                  </a:txBody>
-                  <a:tcPr marL="9525" marR="9525" marT="9525" marB="0" anchor="b"/>
-                </a:tc>
-                <a:tc>
-                  <a:txBody>
-                    <a:bodyPr/>
-                    <a:lstStyle/>
-                    <a:p>
-                      <a:pPr algn="l" fontAlgn="b"/>
-                      <a:endParaRPr lang="en-US" sz="1200" b="0" i="0" u="none" strike="noStrike">
-                        <a:solidFill>
-                          <a:srgbClr val="000000"/>
-                        </a:solidFill>
-                        <a:effectLst/>
-                        <a:latin typeface="Calibri" panose="020F0502020204030204" pitchFamily="34" charset="0"/>
-                      </a:endParaRPr>
-                    </a:p>
-                  </a:txBody>
-                  <a:tcPr marL="9525" marR="9525" marT="9525" marB="0" anchor="b"/>
-                </a:tc>
-                <a:tc>
-                  <a:txBody>
-                    <a:bodyPr/>
-                    <a:lstStyle/>
-                    <a:p>
-                      <a:pPr algn="l" fontAlgn="b"/>
-                      <a:endParaRPr lang="en-US" sz="1200" b="0" i="0" u="none" strike="noStrike">
-                        <a:solidFill>
-                          <a:srgbClr val="000000"/>
-                        </a:solidFill>
-                        <a:effectLst/>
-                        <a:latin typeface="Calibri" panose="020F0502020204030204" pitchFamily="34" charset="0"/>
-                      </a:endParaRPr>
-                    </a:p>
-                  </a:txBody>
-                  <a:tcPr marL="9525" marR="9525" marT="9525" marB="0" anchor="b"/>
-                </a:tc>
-                <a:tc>
-                  <a:txBody>
-                    <a:bodyPr/>
-                    <a:lstStyle/>
-                    <a:p>
-                      <a:pPr algn="r" fontAlgn="b"/>
-                      <a:r>
-                        <a:rPr lang="en-US" sz="1200" u="none" strike="noStrike">
-                          <a:effectLst/>
-                        </a:rPr>
-                        <a:t>0.8372</a:t>
-                      </a:r>
-                      <a:endParaRPr lang="en-US" sz="1200" b="0" i="0" u="none" strike="noStrike">
-                        <a:solidFill>
-                          <a:srgbClr val="000000"/>
-                        </a:solidFill>
-                        <a:effectLst/>
-                        <a:latin typeface="Calibri" panose="020F0502020204030204" pitchFamily="34" charset="0"/>
-                      </a:endParaRPr>
-                    </a:p>
-                  </a:txBody>
-                  <a:tcPr marL="9525" marR="9525" marT="9525" marB="0" anchor="b"/>
-                </a:tc>
-                <a:extLst>
-                  <a:ext uri="{0D108BD9-81ED-4DB2-BD59-A6C34878D82A}">
-                    <a16:rowId xmlns:a16="http://schemas.microsoft.com/office/drawing/2014/main" val="1388936876"/>
-                  </a:ext>
-                </a:extLst>
-              </a:tr>
-              <a:tr h="172559">
-                <a:tc>
-                  <a:txBody>
-                    <a:bodyPr/>
-                    <a:lstStyle/>
-                    <a:p>
-                      <a:pPr algn="l" fontAlgn="b"/>
-                      <a:r>
-                        <a:rPr lang="en-US" sz="1200" u="none" strike="noStrike">
-                          <a:effectLst/>
-                        </a:rPr>
-                        <a:t>Autumn_S2_VI        </a:t>
-                      </a:r>
-                      <a:endParaRPr lang="en-US" sz="1200" b="0" i="0" u="none" strike="noStrike">
-                        <a:solidFill>
-                          <a:srgbClr val="000000"/>
-                        </a:solidFill>
-                        <a:effectLst/>
-                        <a:latin typeface="Calibri" panose="020F0502020204030204" pitchFamily="34" charset="0"/>
-                      </a:endParaRPr>
-                    </a:p>
-                  </a:txBody>
-                  <a:tcPr marL="9525" marR="9525" marT="9525" marB="0" anchor="b"/>
-                </a:tc>
-                <a:tc>
-                  <a:txBody>
-                    <a:bodyPr/>
-                    <a:lstStyle/>
-                    <a:p>
-                      <a:pPr algn="l" fontAlgn="b"/>
-                      <a:endParaRPr lang="en-US" sz="1200" b="0" i="0" u="none" strike="noStrike">
-                        <a:solidFill>
-                          <a:srgbClr val="000000"/>
-                        </a:solidFill>
-                        <a:effectLst/>
-                        <a:latin typeface="Calibri" panose="020F0502020204030204" pitchFamily="34" charset="0"/>
-                      </a:endParaRPr>
-                    </a:p>
-                  </a:txBody>
-                  <a:tcPr marL="9525" marR="9525" marT="9525" marB="0" anchor="b"/>
-                </a:tc>
-                <a:tc>
-                  <a:txBody>
-                    <a:bodyPr/>
-                    <a:lstStyle/>
-                    <a:p>
-                      <a:pPr algn="l" fontAlgn="b"/>
-                      <a:endParaRPr lang="en-US" sz="1200" b="0" i="0" u="none" strike="noStrike">
-                        <a:solidFill>
-                          <a:srgbClr val="000000"/>
-                        </a:solidFill>
-                        <a:effectLst/>
-                        <a:latin typeface="Calibri" panose="020F0502020204030204" pitchFamily="34" charset="0"/>
-                      </a:endParaRPr>
-                    </a:p>
-                  </a:txBody>
-                  <a:tcPr marL="9525" marR="9525" marT="9525" marB="0" anchor="b"/>
-                </a:tc>
-                <a:tc>
-                  <a:txBody>
-                    <a:bodyPr/>
-                    <a:lstStyle/>
-                    <a:p>
-                      <a:pPr algn="r" fontAlgn="b"/>
-                      <a:r>
-                        <a:rPr lang="en-US" sz="1200" u="none" strike="noStrike">
-                          <a:effectLst/>
-                        </a:rPr>
-                        <a:t>0.8198</a:t>
-                      </a:r>
-                      <a:endParaRPr lang="en-US" sz="1200" b="0" i="0" u="none" strike="noStrike">
-                        <a:solidFill>
-                          <a:srgbClr val="000000"/>
-                        </a:solidFill>
-                        <a:effectLst/>
-                        <a:latin typeface="Calibri" panose="020F0502020204030204" pitchFamily="34" charset="0"/>
-                      </a:endParaRPr>
-                    </a:p>
-                  </a:txBody>
-                  <a:tcPr marL="9525" marR="9525" marT="9525" marB="0" anchor="b"/>
-                </a:tc>
-                <a:extLst>
-                  <a:ext uri="{0D108BD9-81ED-4DB2-BD59-A6C34878D82A}">
-                    <a16:rowId xmlns:a16="http://schemas.microsoft.com/office/drawing/2014/main" val="3179122670"/>
-                  </a:ext>
-                </a:extLst>
-              </a:tr>
-              <a:tr h="172559">
-                <a:tc>
-                  <a:txBody>
-                    <a:bodyPr/>
-                    <a:lstStyle/>
-                    <a:p>
-                      <a:pPr algn="l" fontAlgn="b"/>
-                      <a:r>
-                        <a:rPr lang="en-US" sz="1200" u="none" strike="noStrike">
-                          <a:effectLst/>
-                        </a:rPr>
-                        <a:t>Autumn_S2          </a:t>
-                      </a:r>
-                      <a:endParaRPr lang="en-US" sz="1200" b="0" i="0" u="none" strike="noStrike">
-                        <a:solidFill>
-                          <a:srgbClr val="000000"/>
-                        </a:solidFill>
-                        <a:effectLst/>
-                        <a:latin typeface="Calibri" panose="020F0502020204030204" pitchFamily="34" charset="0"/>
-                      </a:endParaRPr>
-                    </a:p>
-                  </a:txBody>
-                  <a:tcPr marL="9525" marR="9525" marT="9525" marB="0" anchor="b"/>
-                </a:tc>
-                <a:tc>
-                  <a:txBody>
-                    <a:bodyPr/>
-                    <a:lstStyle/>
-                    <a:p>
-                      <a:pPr algn="l" fontAlgn="b"/>
-                      <a:endParaRPr lang="en-US" sz="1200" b="0" i="0" u="none" strike="noStrike">
-                        <a:solidFill>
-                          <a:srgbClr val="000000"/>
-                        </a:solidFill>
-                        <a:effectLst/>
-                        <a:latin typeface="Calibri" panose="020F0502020204030204" pitchFamily="34" charset="0"/>
-                      </a:endParaRPr>
-                    </a:p>
-                  </a:txBody>
-                  <a:tcPr marL="9525" marR="9525" marT="9525" marB="0" anchor="b"/>
-                </a:tc>
-                <a:tc>
-                  <a:txBody>
-                    <a:bodyPr/>
-                    <a:lstStyle/>
-                    <a:p>
-                      <a:pPr algn="l" fontAlgn="b"/>
-                      <a:endParaRPr lang="en-US" sz="1200" b="0" i="0" u="none" strike="noStrike">
-                        <a:solidFill>
-                          <a:srgbClr val="000000"/>
-                        </a:solidFill>
-                        <a:effectLst/>
-                        <a:latin typeface="Calibri" panose="020F0502020204030204" pitchFamily="34" charset="0"/>
-                      </a:endParaRPr>
-                    </a:p>
-                  </a:txBody>
-                  <a:tcPr marL="9525" marR="9525" marT="9525" marB="0" anchor="b"/>
-                </a:tc>
-                <a:tc>
-                  <a:txBody>
-                    <a:bodyPr/>
-                    <a:lstStyle/>
-                    <a:p>
-                      <a:pPr algn="r" fontAlgn="b"/>
-                      <a:r>
-                        <a:rPr lang="en-US" sz="1200" u="none" strike="noStrike">
-                          <a:effectLst/>
-                        </a:rPr>
-                        <a:t>0.8049</a:t>
-                      </a:r>
-                      <a:endParaRPr lang="en-US" sz="1200" b="0" i="0" u="none" strike="noStrike">
-                        <a:solidFill>
-                          <a:srgbClr val="000000"/>
-                        </a:solidFill>
-                        <a:effectLst/>
-                        <a:latin typeface="Calibri" panose="020F0502020204030204" pitchFamily="34" charset="0"/>
-                      </a:endParaRPr>
-                    </a:p>
-                  </a:txBody>
-                  <a:tcPr marL="9525" marR="9525" marT="9525" marB="0" anchor="b"/>
-                </a:tc>
-                <a:extLst>
-                  <a:ext uri="{0D108BD9-81ED-4DB2-BD59-A6C34878D82A}">
-                    <a16:rowId xmlns:a16="http://schemas.microsoft.com/office/drawing/2014/main" val="1366214137"/>
-                  </a:ext>
-                </a:extLst>
-              </a:tr>
-              <a:tr h="172559">
-                <a:tc>
-                  <a:txBody>
-                    <a:bodyPr/>
-                    <a:lstStyle/>
-                    <a:p>
-                      <a:pPr algn="l" fontAlgn="b"/>
-                      <a:r>
-                        <a:rPr lang="en-US" sz="1200" u="none" strike="noStrike">
-                          <a:effectLst/>
-                        </a:rPr>
-                        <a:t>Summer_Winter_S1   </a:t>
-                      </a:r>
-                      <a:endParaRPr lang="en-US" sz="1200" b="0" i="0" u="none" strike="noStrike">
-                        <a:solidFill>
-                          <a:srgbClr val="000000"/>
-                        </a:solidFill>
-                        <a:effectLst/>
-                        <a:latin typeface="Calibri" panose="020F0502020204030204" pitchFamily="34" charset="0"/>
-                      </a:endParaRPr>
-                    </a:p>
-                  </a:txBody>
-                  <a:tcPr marL="9525" marR="9525" marT="9525" marB="0" anchor="b"/>
-                </a:tc>
-                <a:tc>
-                  <a:txBody>
-                    <a:bodyPr/>
-                    <a:lstStyle/>
-                    <a:p>
-                      <a:pPr algn="l" fontAlgn="b"/>
-                      <a:endParaRPr lang="en-US" sz="1200" b="0" i="0" u="none" strike="noStrike">
-                        <a:solidFill>
-                          <a:srgbClr val="000000"/>
-                        </a:solidFill>
-                        <a:effectLst/>
-                        <a:latin typeface="Calibri" panose="020F0502020204030204" pitchFamily="34" charset="0"/>
-                      </a:endParaRPr>
-                    </a:p>
-                  </a:txBody>
-                  <a:tcPr marL="9525" marR="9525" marT="9525" marB="0" anchor="b"/>
-                </a:tc>
-                <a:tc>
-                  <a:txBody>
-                    <a:bodyPr/>
-                    <a:lstStyle/>
-                    <a:p>
-                      <a:pPr algn="l" fontAlgn="b"/>
-                      <a:endParaRPr lang="en-US" sz="1200" b="0" i="0" u="none" strike="noStrike">
-                        <a:solidFill>
-                          <a:srgbClr val="000000"/>
-                        </a:solidFill>
-                        <a:effectLst/>
-                        <a:latin typeface="Calibri" panose="020F0502020204030204" pitchFamily="34" charset="0"/>
-                      </a:endParaRPr>
-                    </a:p>
-                  </a:txBody>
-                  <a:tcPr marL="9525" marR="9525" marT="9525" marB="0" anchor="b"/>
-                </a:tc>
-                <a:tc>
-                  <a:txBody>
-                    <a:bodyPr/>
-                    <a:lstStyle/>
-                    <a:p>
-                      <a:pPr algn="r" fontAlgn="b"/>
-                      <a:r>
-                        <a:rPr lang="en-US" sz="1200" u="none" strike="noStrike">
-                          <a:effectLst/>
-                        </a:rPr>
-                        <a:t>0.5574</a:t>
-                      </a:r>
-                      <a:endParaRPr lang="en-US" sz="1200" b="0" i="0" u="none" strike="noStrike">
-                        <a:solidFill>
-                          <a:srgbClr val="000000"/>
-                        </a:solidFill>
-                        <a:effectLst/>
-                        <a:latin typeface="Calibri" panose="020F0502020204030204" pitchFamily="34" charset="0"/>
-                      </a:endParaRPr>
-                    </a:p>
-                  </a:txBody>
-                  <a:tcPr marL="9525" marR="9525" marT="9525" marB="0" anchor="b"/>
-                </a:tc>
-                <a:extLst>
-                  <a:ext uri="{0D108BD9-81ED-4DB2-BD59-A6C34878D82A}">
-                    <a16:rowId xmlns:a16="http://schemas.microsoft.com/office/drawing/2014/main" val="4049814390"/>
-                  </a:ext>
-                </a:extLst>
-              </a:tr>
-              <a:tr h="172559">
-                <a:tc>
-                  <a:txBody>
-                    <a:bodyPr/>
-                    <a:lstStyle/>
-                    <a:p>
-                      <a:pPr algn="l" fontAlgn="b"/>
-                      <a:r>
-                        <a:rPr lang="en-US" sz="1200" u="none" strike="noStrike">
-                          <a:effectLst/>
-                        </a:rPr>
-                        <a:t>Winter_S1_GLCM     </a:t>
-                      </a:r>
-                      <a:endParaRPr lang="en-US" sz="1200" b="0" i="0" u="none" strike="noStrike">
-                        <a:solidFill>
-                          <a:srgbClr val="000000"/>
-                        </a:solidFill>
-                        <a:effectLst/>
-                        <a:latin typeface="Calibri" panose="020F0502020204030204" pitchFamily="34" charset="0"/>
-                      </a:endParaRPr>
-                    </a:p>
-                  </a:txBody>
-                  <a:tcPr marL="9525" marR="9525" marT="9525" marB="0" anchor="b"/>
-                </a:tc>
-                <a:tc>
-                  <a:txBody>
-                    <a:bodyPr/>
-                    <a:lstStyle/>
-                    <a:p>
-                      <a:pPr algn="l" fontAlgn="b"/>
-                      <a:endParaRPr lang="en-US" sz="1200" b="0" i="0" u="none" strike="noStrike">
-                        <a:solidFill>
-                          <a:srgbClr val="000000"/>
-                        </a:solidFill>
-                        <a:effectLst/>
-                        <a:latin typeface="Calibri" panose="020F0502020204030204" pitchFamily="34" charset="0"/>
-                      </a:endParaRPr>
-                    </a:p>
-                  </a:txBody>
-                  <a:tcPr marL="9525" marR="9525" marT="9525" marB="0" anchor="b"/>
-                </a:tc>
-                <a:tc>
-                  <a:txBody>
-                    <a:bodyPr/>
-                    <a:lstStyle/>
-                    <a:p>
-                      <a:pPr algn="l" fontAlgn="b"/>
-                      <a:endParaRPr lang="en-US" sz="1200" b="0" i="0" u="none" strike="noStrike">
-                        <a:solidFill>
-                          <a:srgbClr val="000000"/>
-                        </a:solidFill>
-                        <a:effectLst/>
-                        <a:latin typeface="Calibri" panose="020F0502020204030204" pitchFamily="34" charset="0"/>
-                      </a:endParaRPr>
-                    </a:p>
-                  </a:txBody>
-                  <a:tcPr marL="9525" marR="9525" marT="9525" marB="0" anchor="b"/>
-                </a:tc>
-                <a:tc>
-                  <a:txBody>
-                    <a:bodyPr/>
-                    <a:lstStyle/>
-                    <a:p>
-                      <a:pPr algn="r" fontAlgn="b"/>
-                      <a:r>
-                        <a:rPr lang="en-US" sz="1200" u="none" strike="noStrike">
-                          <a:effectLst/>
-                        </a:rPr>
-                        <a:t>0.4857</a:t>
-                      </a:r>
-                      <a:endParaRPr lang="en-US" sz="1200" b="0" i="0" u="none" strike="noStrike">
-                        <a:solidFill>
-                          <a:srgbClr val="000000"/>
-                        </a:solidFill>
-                        <a:effectLst/>
-                        <a:latin typeface="Calibri" panose="020F0502020204030204" pitchFamily="34" charset="0"/>
-                      </a:endParaRPr>
-                    </a:p>
-                  </a:txBody>
-                  <a:tcPr marL="9525" marR="9525" marT="9525" marB="0" anchor="b"/>
-                </a:tc>
-                <a:extLst>
-                  <a:ext uri="{0D108BD9-81ED-4DB2-BD59-A6C34878D82A}">
-                    <a16:rowId xmlns:a16="http://schemas.microsoft.com/office/drawing/2014/main" val="2378539736"/>
-                  </a:ext>
-                </a:extLst>
-              </a:tr>
-              <a:tr h="172559">
-                <a:tc>
-                  <a:txBody>
-                    <a:bodyPr/>
-                    <a:lstStyle/>
-                    <a:p>
-                      <a:pPr algn="l" fontAlgn="b"/>
-                      <a:r>
-                        <a:rPr lang="en-US" sz="1200" u="none" strike="noStrike">
-                          <a:effectLst/>
-                        </a:rPr>
-                        <a:t>Winter_S1           </a:t>
-                      </a:r>
-                      <a:endParaRPr lang="en-US" sz="1200" b="0" i="0" u="none" strike="noStrike">
-                        <a:solidFill>
-                          <a:srgbClr val="000000"/>
-                        </a:solidFill>
-                        <a:effectLst/>
-                        <a:latin typeface="Calibri" panose="020F0502020204030204" pitchFamily="34" charset="0"/>
-                      </a:endParaRPr>
-                    </a:p>
-                  </a:txBody>
-                  <a:tcPr marL="9525" marR="9525" marT="9525" marB="0" anchor="b"/>
-                </a:tc>
-                <a:tc>
-                  <a:txBody>
-                    <a:bodyPr/>
-                    <a:lstStyle/>
-                    <a:p>
-                      <a:pPr algn="l" fontAlgn="b"/>
-                      <a:endParaRPr lang="en-US" sz="1200" b="0" i="0" u="none" strike="noStrike">
-                        <a:solidFill>
-                          <a:srgbClr val="000000"/>
-                        </a:solidFill>
-                        <a:effectLst/>
-                        <a:latin typeface="Calibri" panose="020F0502020204030204" pitchFamily="34" charset="0"/>
-                      </a:endParaRPr>
-                    </a:p>
-                  </a:txBody>
-                  <a:tcPr marL="9525" marR="9525" marT="9525" marB="0" anchor="b"/>
-                </a:tc>
-                <a:tc>
-                  <a:txBody>
-                    <a:bodyPr/>
-                    <a:lstStyle/>
-                    <a:p>
-                      <a:pPr algn="l" fontAlgn="b"/>
-                      <a:endParaRPr lang="en-US" sz="1200" b="0" i="0" u="none" strike="noStrike">
-                        <a:solidFill>
-                          <a:srgbClr val="000000"/>
-                        </a:solidFill>
-                        <a:effectLst/>
-                        <a:latin typeface="Calibri" panose="020F0502020204030204" pitchFamily="34" charset="0"/>
-                      </a:endParaRPr>
-                    </a:p>
-                  </a:txBody>
-                  <a:tcPr marL="9525" marR="9525" marT="9525" marB="0" anchor="b"/>
-                </a:tc>
-                <a:tc>
-                  <a:txBody>
-                    <a:bodyPr/>
-                    <a:lstStyle/>
-                    <a:p>
-                      <a:pPr algn="r" fontAlgn="b"/>
-                      <a:r>
-                        <a:rPr lang="en-US" sz="1200" u="none" strike="noStrike">
-                          <a:effectLst/>
-                        </a:rPr>
-                        <a:t>0.4629</a:t>
-                      </a:r>
-                      <a:endParaRPr lang="en-US" sz="1200" b="0" i="0" u="none" strike="noStrike">
-                        <a:solidFill>
-                          <a:srgbClr val="000000"/>
-                        </a:solidFill>
-                        <a:effectLst/>
-                        <a:latin typeface="Calibri" panose="020F0502020204030204" pitchFamily="34" charset="0"/>
-                      </a:endParaRPr>
-                    </a:p>
-                  </a:txBody>
-                  <a:tcPr marL="9525" marR="9525" marT="9525" marB="0" anchor="b"/>
-                </a:tc>
-                <a:extLst>
-                  <a:ext uri="{0D108BD9-81ED-4DB2-BD59-A6C34878D82A}">
-                    <a16:rowId xmlns:a16="http://schemas.microsoft.com/office/drawing/2014/main" val="707076986"/>
-                  </a:ext>
-                </a:extLst>
-              </a:tr>
-              <a:tr h="172559">
-                <a:tc>
-                  <a:txBody>
-                    <a:bodyPr/>
-                    <a:lstStyle/>
-                    <a:p>
-                      <a:pPr algn="l" fontAlgn="b"/>
-                      <a:r>
-                        <a:rPr lang="en-US" sz="1200" u="none" strike="noStrike">
-                          <a:effectLst/>
-                        </a:rPr>
-                        <a:t>Summer_S1_GLCM      </a:t>
-                      </a:r>
-                      <a:endParaRPr lang="en-US" sz="1200" b="0" i="0" u="none" strike="noStrike">
-                        <a:solidFill>
-                          <a:srgbClr val="000000"/>
-                        </a:solidFill>
-                        <a:effectLst/>
-                        <a:latin typeface="Calibri" panose="020F0502020204030204" pitchFamily="34" charset="0"/>
-                      </a:endParaRPr>
-                    </a:p>
-                  </a:txBody>
-                  <a:tcPr marL="9525" marR="9525" marT="9525" marB="0" anchor="b"/>
-                </a:tc>
-                <a:tc>
-                  <a:txBody>
-                    <a:bodyPr/>
-                    <a:lstStyle/>
-                    <a:p>
-                      <a:pPr algn="l" fontAlgn="b"/>
-                      <a:endParaRPr lang="en-US" sz="1200" b="0" i="0" u="none" strike="noStrike">
-                        <a:solidFill>
-                          <a:srgbClr val="000000"/>
-                        </a:solidFill>
-                        <a:effectLst/>
-                        <a:latin typeface="Calibri" panose="020F0502020204030204" pitchFamily="34" charset="0"/>
-                      </a:endParaRPr>
-                    </a:p>
-                  </a:txBody>
-                  <a:tcPr marL="9525" marR="9525" marT="9525" marB="0" anchor="b"/>
-                </a:tc>
-                <a:tc>
-                  <a:txBody>
-                    <a:bodyPr/>
-                    <a:lstStyle/>
-                    <a:p>
-                      <a:pPr algn="l" fontAlgn="b"/>
-                      <a:endParaRPr lang="en-US" sz="1200" b="0" i="0" u="none" strike="noStrike">
-                        <a:solidFill>
-                          <a:srgbClr val="000000"/>
-                        </a:solidFill>
-                        <a:effectLst/>
-                        <a:latin typeface="Calibri" panose="020F0502020204030204" pitchFamily="34" charset="0"/>
-                      </a:endParaRPr>
-                    </a:p>
-                  </a:txBody>
-                  <a:tcPr marL="9525" marR="9525" marT="9525" marB="0" anchor="b"/>
-                </a:tc>
-                <a:tc>
-                  <a:txBody>
-                    <a:bodyPr/>
-                    <a:lstStyle/>
-                    <a:p>
-                      <a:pPr algn="r" fontAlgn="b"/>
-                      <a:r>
-                        <a:rPr lang="en-US" sz="1200" u="none" strike="noStrike">
-                          <a:effectLst/>
-                        </a:rPr>
-                        <a:t>0.4531</a:t>
-                      </a:r>
-                      <a:endParaRPr lang="en-US" sz="1200" b="0" i="0" u="none" strike="noStrike">
-                        <a:solidFill>
-                          <a:srgbClr val="000000"/>
-                        </a:solidFill>
-                        <a:effectLst/>
-                        <a:latin typeface="Calibri" panose="020F0502020204030204" pitchFamily="34" charset="0"/>
-                      </a:endParaRPr>
-                    </a:p>
-                  </a:txBody>
-                  <a:tcPr marL="9525" marR="9525" marT="9525" marB="0" anchor="b"/>
-                </a:tc>
-                <a:extLst>
-                  <a:ext uri="{0D108BD9-81ED-4DB2-BD59-A6C34878D82A}">
-                    <a16:rowId xmlns:a16="http://schemas.microsoft.com/office/drawing/2014/main" val="3300075548"/>
-                  </a:ext>
-                </a:extLst>
-              </a:tr>
-              <a:tr h="172559">
-                <a:tc>
-                  <a:txBody>
-                    <a:bodyPr/>
-                    <a:lstStyle/>
-                    <a:p>
-                      <a:pPr algn="l" fontAlgn="b"/>
-                      <a:r>
-                        <a:rPr lang="en-US" sz="1200" u="none" strike="noStrike">
-                          <a:effectLst/>
-                        </a:rPr>
-                        <a:t>Summer_S1          </a:t>
-                      </a:r>
-                      <a:endParaRPr lang="en-US" sz="1200" b="0" i="0" u="none" strike="noStrike">
-                        <a:solidFill>
-                          <a:srgbClr val="000000"/>
-                        </a:solidFill>
-                        <a:effectLst/>
-                        <a:latin typeface="Calibri" panose="020F0502020204030204" pitchFamily="34" charset="0"/>
-                      </a:endParaRPr>
-                    </a:p>
-                  </a:txBody>
-                  <a:tcPr marL="9525" marR="9525" marT="9525" marB="0" anchor="b"/>
-                </a:tc>
-                <a:tc>
-                  <a:txBody>
-                    <a:bodyPr/>
-                    <a:lstStyle/>
-                    <a:p>
-                      <a:pPr algn="l" fontAlgn="b"/>
-                      <a:r>
-                        <a:rPr lang="en-US" sz="1200" u="none" strike="noStrike">
-                          <a:effectLst/>
-                        </a:rPr>
-                        <a:t> </a:t>
-                      </a:r>
-                      <a:endParaRPr lang="en-US" sz="1200" b="0" i="0" u="none" strike="noStrike">
-                        <a:solidFill>
-                          <a:srgbClr val="000000"/>
-                        </a:solidFill>
-                        <a:effectLst/>
-                        <a:latin typeface="Calibri" panose="020F0502020204030204" pitchFamily="34" charset="0"/>
-                      </a:endParaRPr>
-                    </a:p>
-                  </a:txBody>
-                  <a:tcPr marL="9525" marR="9525" marT="9525" marB="0" anchor="b"/>
-                </a:tc>
-                <a:tc>
-                  <a:txBody>
-                    <a:bodyPr/>
-                    <a:lstStyle/>
-                    <a:p>
-                      <a:pPr algn="l" fontAlgn="b"/>
-                      <a:r>
-                        <a:rPr lang="en-US" sz="1200" u="none" strike="noStrike">
-                          <a:effectLst/>
-                        </a:rPr>
-                        <a:t> </a:t>
-                      </a:r>
-                      <a:endParaRPr lang="en-US" sz="1200" b="0" i="0" u="none" strike="noStrike">
-                        <a:solidFill>
-                          <a:srgbClr val="000000"/>
-                        </a:solidFill>
-                        <a:effectLst/>
-                        <a:latin typeface="Calibri" panose="020F0502020204030204" pitchFamily="34" charset="0"/>
-                      </a:endParaRPr>
-                    </a:p>
-                  </a:txBody>
-                  <a:tcPr marL="9525" marR="9525" marT="9525" marB="0" anchor="b"/>
-                </a:tc>
-                <a:tc>
-                  <a:txBody>
-                    <a:bodyPr/>
-                    <a:lstStyle/>
-                    <a:p>
-                      <a:pPr algn="r" fontAlgn="b"/>
-                      <a:r>
-                        <a:rPr lang="en-US" sz="1200" u="none" strike="noStrike" dirty="0">
-                          <a:effectLst/>
-                        </a:rPr>
-                        <a:t>0.4065</a:t>
-                      </a:r>
-                      <a:endParaRPr lang="en-US" sz="1200" b="0" i="0" u="none" strike="noStrike" dirty="0">
-                        <a:solidFill>
-                          <a:srgbClr val="000000"/>
-                        </a:solidFill>
-                        <a:effectLst/>
-                        <a:latin typeface="Calibri" panose="020F0502020204030204" pitchFamily="34" charset="0"/>
-                      </a:endParaRPr>
-                    </a:p>
-                  </a:txBody>
-                  <a:tcPr marL="9525" marR="9525" marT="9525" marB="0" anchor="b"/>
-                </a:tc>
-                <a:extLst>
-                  <a:ext uri="{0D108BD9-81ED-4DB2-BD59-A6C34878D82A}">
-                    <a16:rowId xmlns:a16="http://schemas.microsoft.com/office/drawing/2014/main" val="2796047057"/>
-                  </a:ext>
-                </a:extLst>
-              </a:tr>
-            </a:tbl>
-          </a:graphicData>
-        </a:graphic>
-      </p:graphicFrame>
-    </p:spTree>
-    <p:extLst>
-      <p:ext uri="{BB962C8B-B14F-4D97-AF65-F5344CB8AC3E}">
-        <p14:creationId xmlns:p14="http://schemas.microsoft.com/office/powerpoint/2010/main" val="2888378435"/>
-      </p:ext>
-    </p:extLst>
-  </p:cSld>
-  <p:clrMapOvr>
-    <a:masterClrMapping/>
-  </p:clrMapOvr>
-</p:sld>
-</file>
-
 <file path=ppt/theme/theme1.xml><?xml version="1.0" encoding="utf-8"?>
 <a:theme xmlns:a="http://schemas.openxmlformats.org/drawingml/2006/main" name="Office Theme">
   <a:themeElements>

</xml_diff>